<commit_message>
aggiunta cv ing + mod testo ing aggiunta amicar
</commit_message>
<xml_diff>
--- a/Cv/File modificabili/Cv Davide Giagnacovo - IT.pptx
+++ b/Cv/File modificabili/Cv Davide Giagnacovo - IT.pptx
@@ -112,7 +112,7 @@
             <a:srgbClr val="A4A3A4"/>
           </p15:clr>
         </p15:guide>
-        <p15:guide id="2" pos="2160" userDrawn="1">
+        <p15:guide id="2" pos="4156" userDrawn="1">
           <p15:clr>
             <a:srgbClr val="A4A3A4"/>
           </p15:clr>
@@ -254,7 +254,7 @@
           <a:p>
             <a:fld id="{B1396FFC-11A6-4884-B1AF-427EB703A0FB}" type="datetimeFigureOut">
               <a:rPr lang="it-IT" smtClean="0"/>
-              <a:t>09/07/2020</a:t>
+              <a:t>06/11/2020</a:t>
             </a:fld>
             <a:endParaRPr lang="it-IT"/>
           </a:p>
@@ -424,7 +424,7 @@
           <a:p>
             <a:fld id="{B1396FFC-11A6-4884-B1AF-427EB703A0FB}" type="datetimeFigureOut">
               <a:rPr lang="it-IT" smtClean="0"/>
-              <a:t>09/07/2020</a:t>
+              <a:t>06/11/2020</a:t>
             </a:fld>
             <a:endParaRPr lang="it-IT"/>
           </a:p>
@@ -604,7 +604,7 @@
           <a:p>
             <a:fld id="{B1396FFC-11A6-4884-B1AF-427EB703A0FB}" type="datetimeFigureOut">
               <a:rPr lang="it-IT" smtClean="0"/>
-              <a:t>09/07/2020</a:t>
+              <a:t>06/11/2020</a:t>
             </a:fld>
             <a:endParaRPr lang="it-IT"/>
           </a:p>
@@ -774,7 +774,7 @@
           <a:p>
             <a:fld id="{B1396FFC-11A6-4884-B1AF-427EB703A0FB}" type="datetimeFigureOut">
               <a:rPr lang="it-IT" smtClean="0"/>
-              <a:t>09/07/2020</a:t>
+              <a:t>06/11/2020</a:t>
             </a:fld>
             <a:endParaRPr lang="it-IT"/>
           </a:p>
@@ -1018,7 +1018,7 @@
           <a:p>
             <a:fld id="{B1396FFC-11A6-4884-B1AF-427EB703A0FB}" type="datetimeFigureOut">
               <a:rPr lang="it-IT" smtClean="0"/>
-              <a:t>09/07/2020</a:t>
+              <a:t>06/11/2020</a:t>
             </a:fld>
             <a:endParaRPr lang="it-IT"/>
           </a:p>
@@ -1250,7 +1250,7 @@
           <a:p>
             <a:fld id="{B1396FFC-11A6-4884-B1AF-427EB703A0FB}" type="datetimeFigureOut">
               <a:rPr lang="it-IT" smtClean="0"/>
-              <a:t>09/07/2020</a:t>
+              <a:t>06/11/2020</a:t>
             </a:fld>
             <a:endParaRPr lang="it-IT"/>
           </a:p>
@@ -1617,7 +1617,7 @@
           <a:p>
             <a:fld id="{B1396FFC-11A6-4884-B1AF-427EB703A0FB}" type="datetimeFigureOut">
               <a:rPr lang="it-IT" smtClean="0"/>
-              <a:t>09/07/2020</a:t>
+              <a:t>06/11/2020</a:t>
             </a:fld>
             <a:endParaRPr lang="it-IT"/>
           </a:p>
@@ -1735,7 +1735,7 @@
           <a:p>
             <a:fld id="{B1396FFC-11A6-4884-B1AF-427EB703A0FB}" type="datetimeFigureOut">
               <a:rPr lang="it-IT" smtClean="0"/>
-              <a:t>09/07/2020</a:t>
+              <a:t>06/11/2020</a:t>
             </a:fld>
             <a:endParaRPr lang="it-IT"/>
           </a:p>
@@ -1830,7 +1830,7 @@
           <a:p>
             <a:fld id="{B1396FFC-11A6-4884-B1AF-427EB703A0FB}" type="datetimeFigureOut">
               <a:rPr lang="it-IT" smtClean="0"/>
-              <a:t>09/07/2020</a:t>
+              <a:t>06/11/2020</a:t>
             </a:fld>
             <a:endParaRPr lang="it-IT"/>
           </a:p>
@@ -2107,7 +2107,7 @@
           <a:p>
             <a:fld id="{B1396FFC-11A6-4884-B1AF-427EB703A0FB}" type="datetimeFigureOut">
               <a:rPr lang="it-IT" smtClean="0"/>
-              <a:t>09/07/2020</a:t>
+              <a:t>06/11/2020</a:t>
             </a:fld>
             <a:endParaRPr lang="it-IT"/>
           </a:p>
@@ -2364,7 +2364,7 @@
           <a:p>
             <a:fld id="{B1396FFC-11A6-4884-B1AF-427EB703A0FB}" type="datetimeFigureOut">
               <a:rPr lang="it-IT" smtClean="0"/>
-              <a:t>09/07/2020</a:t>
+              <a:t>06/11/2020</a:t>
             </a:fld>
             <a:endParaRPr lang="it-IT"/>
           </a:p>
@@ -2577,7 +2577,7 @@
           <a:p>
             <a:fld id="{B1396FFC-11A6-4884-B1AF-427EB703A0FB}" type="datetimeFigureOut">
               <a:rPr lang="it-IT" smtClean="0"/>
-              <a:t>09/07/2020</a:t>
+              <a:t>06/11/2020</a:t>
             </a:fld>
             <a:endParaRPr lang="it-IT"/>
           </a:p>
@@ -7528,7 +7528,7 @@
         </p:nvSpPr>
         <p:spPr>
           <a:xfrm>
-            <a:off x="2852738" y="728405"/>
+            <a:off x="2852738" y="607755"/>
             <a:ext cx="1061263" cy="994888"/>
           </a:xfrm>
           <a:prstGeom prst="rect">
@@ -7798,7 +7798,7 @@
         </p:nvSpPr>
         <p:spPr>
           <a:xfrm>
-            <a:off x="4875285" y="742620"/>
+            <a:off x="4875285" y="621970"/>
             <a:ext cx="751728" cy="256224"/>
           </a:xfrm>
           <a:prstGeom prst="rect">
@@ -7842,7 +7842,7 @@
         </p:nvCxnSpPr>
         <p:spPr>
           <a:xfrm>
-            <a:off x="2852738" y="1870153"/>
+            <a:off x="2852738" y="1724103"/>
             <a:ext cx="3756580" cy="0"/>
           </a:xfrm>
           <a:prstGeom prst="line">
@@ -7883,7 +7883,7 @@
         </p:nvGrpSpPr>
         <p:grpSpPr>
           <a:xfrm>
-            <a:off x="2866141" y="2093774"/>
+            <a:off x="2866141" y="1846124"/>
             <a:ext cx="370296" cy="299244"/>
             <a:chOff x="3289027" y="650478"/>
             <a:chExt cx="370296" cy="299244"/>
@@ -8010,7 +8010,7 @@
         </p:nvSpPr>
         <p:spPr>
           <a:xfrm>
-            <a:off x="3236438" y="2120285"/>
+            <a:off x="3236438" y="1872635"/>
             <a:ext cx="2360291" cy="246221"/>
           </a:xfrm>
           <a:prstGeom prst="rect">
@@ -8301,7 +8301,7 @@
         </p:nvSpPr>
         <p:spPr>
           <a:xfrm>
-            <a:off x="2927502" y="2151175"/>
+            <a:off x="2927502" y="1903525"/>
             <a:ext cx="182685" cy="182199"/>
           </a:xfrm>
           <a:custGeom>
@@ -8591,7 +8591,7 @@
         </p:nvSpPr>
         <p:spPr>
           <a:xfrm>
-            <a:off x="2879615" y="2611946"/>
+            <a:off x="2879615" y="2275396"/>
             <a:ext cx="82402" cy="82402"/>
           </a:xfrm>
           <a:prstGeom prst="ellipse">
@@ -8643,7 +8643,7 @@
         </p:nvSpPr>
         <p:spPr>
           <a:xfrm>
-            <a:off x="2927501" y="2553120"/>
+            <a:off x="2927501" y="3397670"/>
             <a:ext cx="682473" cy="200055"/>
           </a:xfrm>
           <a:prstGeom prst="rect">
@@ -8680,7 +8680,7 @@
         </p:nvSpPr>
         <p:spPr>
           <a:xfrm>
-            <a:off x="3593483" y="2537731"/>
+            <a:off x="3593483" y="3382281"/>
             <a:ext cx="3099417" cy="230832"/>
           </a:xfrm>
           <a:prstGeom prst="rect">
@@ -8720,7 +8720,7 @@
         </p:nvSpPr>
         <p:spPr>
           <a:xfrm>
-            <a:off x="3007251" y="3172526"/>
+            <a:off x="3007251" y="4017076"/>
             <a:ext cx="74364" cy="103066"/>
           </a:xfrm>
           <a:custGeom>
@@ -8852,7 +8852,7 @@
         </p:nvSpPr>
         <p:spPr>
           <a:xfrm>
-            <a:off x="3078650" y="3124032"/>
+            <a:off x="3078650" y="3968582"/>
             <a:ext cx="480995" cy="200055"/>
           </a:xfrm>
           <a:prstGeom prst="rect">
@@ -8892,7 +8892,7 @@
         </p:nvSpPr>
         <p:spPr>
           <a:xfrm>
-            <a:off x="3605355" y="2799004"/>
+            <a:off x="3605355" y="3643554"/>
             <a:ext cx="2975387" cy="1323439"/>
           </a:xfrm>
           <a:prstGeom prst="rect">
@@ -8906,6 +8906,7 @@
           </a:bodyPr>
           <a:lstStyle/>
           <a:p>
+            <a:pPr marL="88900" indent="-88900"/>
             <a:r>
               <a:rPr lang="it-IT" sz="800" dirty="0">
                 <a:solidFill>
@@ -8917,6 +8918,7 @@
             </a:r>
           </a:p>
           <a:p>
+            <a:pPr marL="88900" indent="-88900"/>
             <a:r>
               <a:rPr lang="it-IT" sz="800" dirty="0">
                 <a:solidFill>
@@ -8946,6 +8948,7 @@
             </a:r>
           </a:p>
           <a:p>
+            <a:pPr marL="88900" indent="-88900"/>
             <a:r>
               <a:rPr lang="it-IT" sz="800" dirty="0">
                 <a:solidFill>
@@ -8953,10 +8956,11 @@
                 </a:solidFill>
                 <a:latin typeface="Montserrat" panose="00000500000000000000" pitchFamily="2" charset="0"/>
               </a:rPr>
-              <a:t>▪ Massimizzazione del ROI, attraverso analisi di mercato KPI e analisi SWOT</a:t>
+              <a:t>▪ Monitoraggio delle statistiche di vendita (KPI)</a:t>
             </a:r>
           </a:p>
           <a:p>
+            <a:pPr marL="88900" indent="-88900"/>
             <a:r>
               <a:rPr lang="it-IT" sz="800" dirty="0">
                 <a:solidFill>
@@ -8964,10 +8968,23 @@
                 </a:solidFill>
                 <a:latin typeface="Montserrat" panose="00000500000000000000" pitchFamily="2" charset="0"/>
               </a:rPr>
-              <a:t>▪ Sviluppo piani di marketing strategico </a:t>
+              <a:t>▪ Gestione budget marketing</a:t>
             </a:r>
           </a:p>
           <a:p>
+            <a:pPr marL="88900" indent="-88900"/>
+            <a:r>
+              <a:rPr lang="it-IT" sz="800" dirty="0">
+                <a:solidFill>
+                  <a:srgbClr val="000000"/>
+                </a:solidFill>
+                <a:latin typeface="Montserrat" panose="00000500000000000000" pitchFamily="2" charset="0"/>
+              </a:rPr>
+              <a:t>▪ Sviluppare piani di marketing strategico </a:t>
+            </a:r>
+          </a:p>
+          <a:p>
+            <a:pPr marL="88900" indent="-88900"/>
             <a:r>
               <a:rPr lang="it-IT" sz="800" dirty="0">
                 <a:solidFill>
@@ -8979,6 +8996,7 @@
             </a:r>
           </a:p>
           <a:p>
+            <a:pPr marL="88900" indent="-88900"/>
             <a:r>
               <a:rPr lang="it-IT" sz="800" dirty="0">
                 <a:solidFill>
@@ -8986,17 +9004,11 @@
                 </a:solidFill>
                 <a:latin typeface="Montserrat" panose="00000500000000000000" pitchFamily="2" charset="0"/>
               </a:rPr>
-              <a:t>▪ Analisi SEO sito Web (</a:t>
+              <a:t>▪ Responsabile del team nuovi progetti </a:t>
             </a:r>
-            <a:r>
-              <a:rPr lang="it-IT" sz="800" dirty="0" err="1">
-                <a:solidFill>
-                  <a:srgbClr val="000000"/>
-                </a:solidFill>
-                <a:latin typeface="Montserrat" panose="00000500000000000000" pitchFamily="2" charset="0"/>
-              </a:rPr>
-              <a:t>Search</a:t>
-            </a:r>
+          </a:p>
+          <a:p>
+            <a:pPr marL="88900" indent="-88900"/>
             <a:r>
               <a:rPr lang="it-IT" sz="800" dirty="0">
                 <a:solidFill>
@@ -9004,36 +9016,7 @@
                 </a:solidFill>
                 <a:latin typeface="Montserrat" panose="00000500000000000000" pitchFamily="2" charset="0"/>
               </a:rPr>
-              <a:t> Engine </a:t>
-            </a:r>
-            <a:r>
-              <a:rPr lang="it-IT" sz="800" dirty="0" err="1">
-                <a:solidFill>
-                  <a:srgbClr val="000000"/>
-                </a:solidFill>
-                <a:latin typeface="Montserrat" panose="00000500000000000000" pitchFamily="2" charset="0"/>
-              </a:rPr>
-              <a:t>Optimization</a:t>
-            </a:r>
-            <a:r>
-              <a:rPr lang="it-IT" sz="800" dirty="0">
-                <a:solidFill>
-                  <a:srgbClr val="000000"/>
-                </a:solidFill>
-                <a:latin typeface="Montserrat" panose="00000500000000000000" pitchFamily="2" charset="0"/>
-              </a:rPr>
-              <a:t>)</a:t>
-            </a:r>
-          </a:p>
-          <a:p>
-            <a:r>
-              <a:rPr lang="it-IT" sz="800" dirty="0">
-                <a:solidFill>
-                  <a:srgbClr val="000000"/>
-                </a:solidFill>
-                <a:latin typeface="Montserrat" panose="00000500000000000000" pitchFamily="2" charset="0"/>
-              </a:rPr>
-              <a:t>▪ Responsabile del team nuovi progetti</a:t>
+              <a:t>▪ Elaborazione ordini e gestione spedizioni</a:t>
             </a:r>
           </a:p>
         </p:txBody>
@@ -9052,7 +9035,7 @@
         </p:nvSpPr>
         <p:spPr>
           <a:xfrm>
-            <a:off x="2930221" y="4153018"/>
+            <a:off x="2930221" y="5015348"/>
             <a:ext cx="682473" cy="200055"/>
           </a:xfrm>
           <a:prstGeom prst="rect">
@@ -9089,7 +9072,7 @@
         </p:nvSpPr>
         <p:spPr>
           <a:xfrm>
-            <a:off x="3596204" y="4137629"/>
+            <a:off x="3596204" y="4999959"/>
             <a:ext cx="2495034" cy="230832"/>
           </a:xfrm>
           <a:prstGeom prst="rect">
@@ -9129,8 +9112,8 @@
         </p:nvSpPr>
         <p:spPr>
           <a:xfrm>
-            <a:off x="3608075" y="4398902"/>
-            <a:ext cx="2975387" cy="1323439"/>
+            <a:off x="3608075" y="5261232"/>
+            <a:ext cx="3006410" cy="1077218"/>
           </a:xfrm>
           <a:prstGeom prst="rect">
             <a:avLst/>
@@ -9143,6 +9126,7 @@
           </a:bodyPr>
           <a:lstStyle/>
           <a:p>
+            <a:pPr marL="88900" indent="-88900"/>
             <a:r>
               <a:rPr lang="it-IT" sz="800" dirty="0">
                 <a:solidFill>
@@ -9150,25 +9134,11 @@
                 </a:solidFill>
                 <a:latin typeface="Montserrat" panose="00000500000000000000" pitchFamily="2" charset="0"/>
               </a:rPr>
-              <a:t>▪ Realizzazione offerte commerciali e interfacciamento con commerciale </a:t>
+              <a:t>▪ Ricevere le richieste di vendita dei clienti, fornire preventivi, informazioni, supporto e dettagli sui prezzi</a:t>
             </a:r>
-            <a:r>
-              <a:rPr lang="it-IT" sz="800" dirty="0" err="1">
-                <a:solidFill>
-                  <a:srgbClr val="000000"/>
-                </a:solidFill>
-                <a:latin typeface="Montserrat" panose="00000500000000000000" pitchFamily="2" charset="0"/>
-              </a:rPr>
-              <a:t>PosteItaliane</a:t>
-            </a:r>
-            <a:endParaRPr lang="it-IT" sz="800" dirty="0">
-              <a:solidFill>
-                <a:srgbClr val="000000"/>
-              </a:solidFill>
-              <a:latin typeface="Montserrat" panose="00000500000000000000" pitchFamily="2" charset="0"/>
-            </a:endParaRPr>
           </a:p>
           <a:p>
+            <a:pPr marL="88900" indent="-88900"/>
             <a:r>
               <a:rPr lang="it-IT" sz="800" dirty="0">
                 <a:solidFill>
@@ -9198,6 +9168,7 @@
             </a:r>
           </a:p>
           <a:p>
+            <a:pPr marL="88900" indent="-88900"/>
             <a:r>
               <a:rPr lang="it-IT" sz="800" dirty="0">
                 <a:solidFill>
@@ -9205,10 +9176,11 @@
                 </a:solidFill>
                 <a:latin typeface="Montserrat" panose="00000500000000000000" pitchFamily="2" charset="0"/>
               </a:rPr>
-              <a:t>▪ Costruttore di relazioni di lungo termine con i clienti esistenti</a:t>
+              <a:t>▪ Costruire relazioni di lungo termine con i clienti</a:t>
             </a:r>
           </a:p>
           <a:p>
+            <a:pPr marL="88900" indent="-88900"/>
             <a:r>
               <a:rPr lang="it-IT" sz="800" dirty="0">
                 <a:solidFill>
@@ -9216,10 +9188,11 @@
                 </a:solidFill>
                 <a:latin typeface="Montserrat" panose="00000500000000000000" pitchFamily="2" charset="0"/>
               </a:rPr>
-              <a:t>▪ Attività di comunicazione ai clienti per il lancio di novità o promozioni</a:t>
+              <a:t>▪ Comunicazione per il lancio di novità e promozioni</a:t>
             </a:r>
           </a:p>
           <a:p>
+            <a:pPr marL="88900" indent="-88900"/>
             <a:r>
               <a:rPr lang="it-IT" sz="800" dirty="0">
                 <a:solidFill>
@@ -9231,6 +9204,7 @@
             </a:r>
           </a:p>
           <a:p>
+            <a:pPr marL="88900" indent="-88900"/>
             <a:r>
               <a:rPr lang="it-IT" sz="800" dirty="0">
                 <a:solidFill>
@@ -9257,7 +9231,7 @@
         </p:nvSpPr>
         <p:spPr>
           <a:xfrm>
-            <a:off x="3070175" y="2860889"/>
+            <a:off x="3070175" y="3705439"/>
             <a:ext cx="480995" cy="200055"/>
           </a:xfrm>
           <a:prstGeom prst="rect">
@@ -9297,7 +9271,7 @@
         </p:nvGrpSpPr>
         <p:grpSpPr>
           <a:xfrm>
-            <a:off x="2983312" y="2888992"/>
+            <a:off x="2983312" y="3733542"/>
             <a:ext cx="125683" cy="126926"/>
             <a:chOff x="-59100700" y="1911950"/>
             <a:chExt cx="315875" cy="319000"/>
@@ -10332,7 +10306,7 @@
         </p:nvSpPr>
         <p:spPr>
           <a:xfrm>
-            <a:off x="3002180" y="4772424"/>
+            <a:off x="3002180" y="5634754"/>
             <a:ext cx="74364" cy="103066"/>
           </a:xfrm>
           <a:custGeom>
@@ -10464,7 +10438,7 @@
         </p:nvSpPr>
         <p:spPr>
           <a:xfrm>
-            <a:off x="3073579" y="4723930"/>
+            <a:off x="3073579" y="5586260"/>
             <a:ext cx="480995" cy="200055"/>
           </a:xfrm>
           <a:prstGeom prst="rect">
@@ -10504,7 +10478,7 @@
         </p:nvSpPr>
         <p:spPr>
           <a:xfrm>
-            <a:off x="3065104" y="4460787"/>
+            <a:off x="3065104" y="5323117"/>
             <a:ext cx="528379" cy="200055"/>
           </a:xfrm>
           <a:prstGeom prst="rect">
@@ -10550,7 +10524,7 @@
         </p:nvGrpSpPr>
         <p:grpSpPr>
           <a:xfrm>
-            <a:off x="2978241" y="4488890"/>
+            <a:off x="2978241" y="5351220"/>
             <a:ext cx="125683" cy="126926"/>
             <a:chOff x="-59100700" y="1911950"/>
             <a:chExt cx="315875" cy="319000"/>
@@ -11585,7 +11559,7 @@
         </p:nvSpPr>
         <p:spPr>
           <a:xfrm>
-            <a:off x="2879615" y="5885248"/>
+            <a:off x="2879615" y="6437698"/>
             <a:ext cx="82402" cy="82402"/>
           </a:xfrm>
           <a:prstGeom prst="ellipse">
@@ -11637,7 +11611,7 @@
         </p:nvSpPr>
         <p:spPr>
           <a:xfrm>
-            <a:off x="2927501" y="5826422"/>
+            <a:off x="2927501" y="6404272"/>
             <a:ext cx="682473" cy="200055"/>
           </a:xfrm>
           <a:prstGeom prst="rect">
@@ -11674,7 +11648,7 @@
         </p:nvSpPr>
         <p:spPr>
           <a:xfrm>
-            <a:off x="3593483" y="5811033"/>
+            <a:off x="3593483" y="6388883"/>
             <a:ext cx="2027893" cy="230832"/>
           </a:xfrm>
           <a:prstGeom prst="rect">
@@ -11714,8 +11688,8 @@
         </p:nvSpPr>
         <p:spPr>
           <a:xfrm>
-            <a:off x="3605355" y="6072306"/>
-            <a:ext cx="2975387" cy="1323439"/>
+            <a:off x="3605355" y="6650156"/>
+            <a:ext cx="2975387" cy="830997"/>
           </a:xfrm>
           <a:prstGeom prst="rect">
             <a:avLst/>
@@ -11728,6 +11702,7 @@
           </a:bodyPr>
           <a:lstStyle/>
           <a:p>
+            <a:pPr marL="88900" indent="-88900"/>
             <a:r>
               <a:rPr lang="it-IT" sz="800" dirty="0">
                 <a:solidFill>
@@ -11739,6 +11714,7 @@
             </a:r>
           </a:p>
           <a:p>
+            <a:pPr marL="88900" indent="-88900"/>
             <a:r>
               <a:rPr lang="it-IT" sz="800" dirty="0">
                 <a:solidFill>
@@ -11746,7 +11722,7 @@
                 </a:solidFill>
                 <a:latin typeface="Montserrat" panose="00000500000000000000" pitchFamily="2" charset="0"/>
               </a:rPr>
-              <a:t>▪ Attività commerciale </a:t>
+              <a:t>▪ Attività Commerciale </a:t>
             </a:r>
             <a:r>
               <a:rPr lang="it-IT" sz="800" dirty="0" err="1">
@@ -11757,6 +11733,15 @@
               </a:rPr>
               <a:t>InSale</a:t>
             </a:r>
+            <a:endParaRPr lang="it-IT" sz="800" dirty="0">
+              <a:solidFill>
+                <a:srgbClr val="000000"/>
+              </a:solidFill>
+              <a:latin typeface="Montserrat" panose="00000500000000000000" pitchFamily="2" charset="0"/>
+            </a:endParaRPr>
+          </a:p>
+          <a:p>
+            <a:pPr marL="88900" indent="-88900"/>
             <a:r>
               <a:rPr lang="it-IT" sz="800" dirty="0">
                 <a:solidFill>
@@ -11764,32 +11749,11 @@
                 </a:solidFill>
                 <a:latin typeface="Montserrat" panose="00000500000000000000" pitchFamily="2" charset="0"/>
               </a:rPr>
-              <a:t>: realizzazione offerte commerciali</a:t>
+              <a:t>▪ Analisi di mercato e della concorrenza</a:t>
             </a:r>
           </a:p>
           <a:p>
-            <a:r>
-              <a:rPr lang="it-IT" sz="800" dirty="0">
-                <a:solidFill>
-                  <a:srgbClr val="000000"/>
-                </a:solidFill>
-                <a:latin typeface="Montserrat" panose="00000500000000000000" pitchFamily="2" charset="0"/>
-              </a:rPr>
-              <a:t>▪ Analisi di mercato e delle concorrenza</a:t>
-            </a:r>
-          </a:p>
-          <a:p>
-            <a:r>
-              <a:rPr lang="it-IT" sz="800" dirty="0">
-                <a:solidFill>
-                  <a:srgbClr val="000000"/>
-                </a:solidFill>
-                <a:latin typeface="Montserrat" panose="00000500000000000000" pitchFamily="2" charset="0"/>
-              </a:rPr>
-              <a:t>▪ Realizzazione materiale comunicativo con strumenti grafici</a:t>
-            </a:r>
-          </a:p>
-          <a:p>
+            <a:pPr marL="88900" indent="-88900"/>
             <a:r>
               <a:rPr lang="it-IT" sz="800" dirty="0">
                 <a:solidFill>
@@ -11798,17 +11762,6 @@
                 <a:latin typeface="Montserrat" panose="00000500000000000000" pitchFamily="2" charset="0"/>
               </a:rPr>
               <a:t>▪ Gestione team Madrelingua per interfacciamento con clienti esteri ( 4/6 risorse )</a:t>
-            </a:r>
-          </a:p>
-          <a:p>
-            <a:r>
-              <a:rPr lang="it-IT" sz="800" dirty="0">
-                <a:solidFill>
-                  <a:srgbClr val="000000"/>
-                </a:solidFill>
-                <a:latin typeface="Montserrat" panose="00000500000000000000" pitchFamily="2" charset="0"/>
-              </a:rPr>
-              <a:t>▪ Attività di formazione nuove risorse</a:t>
             </a:r>
           </a:p>
         </p:txBody>
@@ -11827,7 +11780,7 @@
         </p:nvSpPr>
         <p:spPr>
           <a:xfrm>
-            <a:off x="2999460" y="6445828"/>
+            <a:off x="2999460" y="7023678"/>
             <a:ext cx="74364" cy="103066"/>
           </a:xfrm>
           <a:custGeom>
@@ -11959,7 +11912,7 @@
         </p:nvSpPr>
         <p:spPr>
           <a:xfrm>
-            <a:off x="3070859" y="6397334"/>
+            <a:off x="3070859" y="6975184"/>
             <a:ext cx="480995" cy="200055"/>
           </a:xfrm>
           <a:prstGeom prst="rect">
@@ -11999,7 +11952,7 @@
         </p:nvSpPr>
         <p:spPr>
           <a:xfrm>
-            <a:off x="3057230" y="6082064"/>
+            <a:off x="3057230" y="6659914"/>
             <a:ext cx="665842" cy="307777"/>
           </a:xfrm>
           <a:prstGeom prst="rect">
@@ -12039,7 +11992,7 @@
         </p:nvGrpSpPr>
         <p:grpSpPr>
           <a:xfrm>
-            <a:off x="2977902" y="6162294"/>
+            <a:off x="2977902" y="6740144"/>
             <a:ext cx="125683" cy="126926"/>
             <a:chOff x="-59100700" y="1911950"/>
             <a:chExt cx="315875" cy="319000"/>
@@ -13078,8 +13031,8 @@
         </p:nvCxnSpPr>
         <p:spPr>
           <a:xfrm>
-            <a:off x="2920816" y="2694348"/>
-            <a:ext cx="0" cy="3190900"/>
+            <a:off x="2920816" y="2357798"/>
+            <a:ext cx="0" cy="4079900"/>
           </a:xfrm>
           <a:prstGeom prst="line">
             <a:avLst/>
@@ -13120,7 +13073,7 @@
         </p:nvSpPr>
         <p:spPr>
           <a:xfrm>
-            <a:off x="2879615" y="4211844"/>
+            <a:off x="2879615" y="5074174"/>
             <a:ext cx="82402" cy="82402"/>
           </a:xfrm>
           <a:prstGeom prst="ellipse">
@@ -13174,7 +13127,7 @@
         </p:nvCxnSpPr>
         <p:spPr>
           <a:xfrm>
-            <a:off x="2852738" y="7500793"/>
+            <a:off x="2852738" y="7562712"/>
             <a:ext cx="3756580" cy="0"/>
           </a:xfrm>
           <a:prstGeom prst="line">
@@ -13215,7 +13168,7 @@
         </p:nvGrpSpPr>
         <p:grpSpPr>
           <a:xfrm>
-            <a:off x="2866141" y="7681830"/>
+            <a:off x="2866141" y="7743749"/>
             <a:ext cx="370296" cy="299244"/>
             <a:chOff x="3289027" y="650478"/>
             <a:chExt cx="370296" cy="299244"/>
@@ -13342,7 +13295,7 @@
         </p:nvSpPr>
         <p:spPr>
           <a:xfrm>
-            <a:off x="3236438" y="7708341"/>
+            <a:off x="3236438" y="7770260"/>
             <a:ext cx="1836707" cy="246221"/>
           </a:xfrm>
           <a:prstGeom prst="rect">
@@ -13722,1106 +13675,6 @@
           </a:p>
         </p:txBody>
       </p:sp>
-      <p:grpSp>
-        <p:nvGrpSpPr>
-          <p:cNvPr id="289" name="Gruppo 288">
-            <a:extLst>
-              <a:ext uri="{FF2B5EF4-FFF2-40B4-BE49-F238E27FC236}">
-                <a16:creationId xmlns:a16="http://schemas.microsoft.com/office/drawing/2014/main" id="{AD5AA9AF-CAC1-4E92-BD7B-4B1E2D76A8DF}"/>
-              </a:ext>
-            </a:extLst>
-          </p:cNvPr>
-          <p:cNvGrpSpPr/>
-          <p:nvPr/>
-        </p:nvGrpSpPr>
-        <p:grpSpPr>
-          <a:xfrm>
-            <a:off x="2541580" y="8107477"/>
-            <a:ext cx="1454313" cy="996846"/>
-            <a:chOff x="2756060" y="8072731"/>
-            <a:chExt cx="1454313" cy="996846"/>
-          </a:xfrm>
-        </p:grpSpPr>
-        <p:sp>
-          <p:nvSpPr>
-            <p:cNvPr id="304" name="Ovale 303">
-              <a:extLst>
-                <a:ext uri="{FF2B5EF4-FFF2-40B4-BE49-F238E27FC236}">
-                  <a16:creationId xmlns:a16="http://schemas.microsoft.com/office/drawing/2014/main" id="{71875559-7EA8-4F89-A4BA-90527472B41E}"/>
-                </a:ext>
-              </a:extLst>
-            </p:cNvPr>
-            <p:cNvSpPr/>
-            <p:nvPr/>
-          </p:nvSpPr>
-          <p:spPr>
-            <a:xfrm>
-              <a:off x="3442015" y="8072731"/>
-              <a:ext cx="82402" cy="82402"/>
-            </a:xfrm>
-            <a:prstGeom prst="ellipse">
-              <a:avLst/>
-            </a:prstGeom>
-            <a:solidFill>
-              <a:srgbClr val="862121"/>
-            </a:solidFill>
-            <a:ln>
-              <a:noFill/>
-            </a:ln>
-          </p:spPr>
-          <p:style>
-            <a:lnRef idx="2">
-              <a:schemeClr val="accent1">
-                <a:shade val="50000"/>
-              </a:schemeClr>
-            </a:lnRef>
-            <a:fillRef idx="1">
-              <a:schemeClr val="accent1"/>
-            </a:fillRef>
-            <a:effectRef idx="0">
-              <a:schemeClr val="accent1"/>
-            </a:effectRef>
-            <a:fontRef idx="minor">
-              <a:schemeClr val="lt1"/>
-            </a:fontRef>
-          </p:style>
-          <p:txBody>
-            <a:bodyPr rtlCol="0" anchor="ctr"/>
-            <a:lstStyle/>
-            <a:p>
-              <a:pPr algn="ctr"/>
-              <a:endParaRPr lang="it-IT"/>
-            </a:p>
-          </p:txBody>
-        </p:sp>
-        <p:sp>
-          <p:nvSpPr>
-            <p:cNvPr id="305" name="CasellaDiTesto 304">
-              <a:extLst>
-                <a:ext uri="{FF2B5EF4-FFF2-40B4-BE49-F238E27FC236}">
-                  <a16:creationId xmlns:a16="http://schemas.microsoft.com/office/drawing/2014/main" id="{291A06D6-EBCC-44B6-9BD8-3F00439236A1}"/>
-                </a:ext>
-              </a:extLst>
-            </p:cNvPr>
-            <p:cNvSpPr txBox="1"/>
-            <p:nvPr/>
-          </p:nvSpPr>
-          <p:spPr>
-            <a:xfrm>
-              <a:off x="3141980" y="8446679"/>
-              <a:ext cx="682473" cy="200055"/>
-            </a:xfrm>
-            <a:prstGeom prst="rect">
-              <a:avLst/>
-            </a:prstGeom>
-            <a:noFill/>
-          </p:spPr>
-          <p:txBody>
-            <a:bodyPr wrap="square" rtlCol="0">
-              <a:spAutoFit/>
-            </a:bodyPr>
-            <a:lstStyle/>
-            <a:p>
-              <a:pPr algn="ctr"/>
-              <a:r>
-                <a:rPr lang="it-IT" sz="700" dirty="0">
-                  <a:latin typeface="Montserrat Light" panose="00000400000000000000" pitchFamily="2" charset="0"/>
-                </a:rPr>
-                <a:t>2014 - 2016</a:t>
-              </a:r>
-            </a:p>
-          </p:txBody>
-        </p:sp>
-        <p:sp>
-          <p:nvSpPr>
-            <p:cNvPr id="306" name="CasellaDiTesto 305">
-              <a:extLst>
-                <a:ext uri="{FF2B5EF4-FFF2-40B4-BE49-F238E27FC236}">
-                  <a16:creationId xmlns:a16="http://schemas.microsoft.com/office/drawing/2014/main" id="{82DC21BA-B3A9-4E47-9234-17CEC254C9A0}"/>
-                </a:ext>
-              </a:extLst>
-            </p:cNvPr>
-            <p:cNvSpPr txBox="1"/>
-            <p:nvPr/>
-          </p:nvSpPr>
-          <p:spPr>
-            <a:xfrm>
-              <a:off x="2756060" y="8156915"/>
-              <a:ext cx="1454313" cy="369332"/>
-            </a:xfrm>
-            <a:prstGeom prst="rect">
-              <a:avLst/>
-            </a:prstGeom>
-            <a:noFill/>
-          </p:spPr>
-          <p:txBody>
-            <a:bodyPr wrap="square" rtlCol="0">
-              <a:spAutoFit/>
-            </a:bodyPr>
-            <a:lstStyle/>
-            <a:p>
-              <a:pPr algn="ctr"/>
-              <a:r>
-                <a:rPr lang="en-US" sz="900" dirty="0">
-                  <a:solidFill>
-                    <a:srgbClr val="5A5A5A"/>
-                  </a:solidFill>
-                  <a:latin typeface="Montserrat SemiBold" panose="00000700000000000000" pitchFamily="2" charset="0"/>
-                </a:rPr>
-                <a:t>Specializzazione in</a:t>
-              </a:r>
-            </a:p>
-            <a:p>
-              <a:pPr algn="ctr"/>
-              <a:r>
-                <a:rPr lang="en-US" sz="900" dirty="0">
-                  <a:solidFill>
-                    <a:srgbClr val="5A5A5A"/>
-                  </a:solidFill>
-                  <a:latin typeface="Montserrat SemiBold" panose="00000700000000000000" pitchFamily="2" charset="0"/>
-                </a:rPr>
-                <a:t> Marketing</a:t>
-              </a:r>
-            </a:p>
-          </p:txBody>
-        </p:sp>
-        <p:sp>
-          <p:nvSpPr>
-            <p:cNvPr id="307" name="Google Shape;4016;p36">
-              <a:extLst>
-                <a:ext uri="{FF2B5EF4-FFF2-40B4-BE49-F238E27FC236}">
-                  <a16:creationId xmlns:a16="http://schemas.microsoft.com/office/drawing/2014/main" id="{CAEBBC10-E1E4-4035-8573-957CC7653A79}"/>
-                </a:ext>
-              </a:extLst>
-            </p:cNvPr>
-            <p:cNvSpPr/>
-            <p:nvPr/>
-          </p:nvSpPr>
-          <p:spPr>
-            <a:xfrm>
-              <a:off x="3446034" y="8759971"/>
-              <a:ext cx="74364" cy="103066"/>
-            </a:xfrm>
-            <a:custGeom>
-              <a:avLst/>
-              <a:gdLst/>
-              <a:ahLst/>
-              <a:cxnLst/>
-              <a:rect l="l" t="t" r="r" b="b"/>
-              <a:pathLst>
-                <a:path w="12426" h="17222" extrusionOk="0">
-                  <a:moveTo>
-                    <a:pt x="6213" y="3388"/>
-                  </a:moveTo>
-                  <a:cubicBezTo>
-                    <a:pt x="7354" y="3388"/>
-                    <a:pt x="8384" y="4074"/>
-                    <a:pt x="8821" y="5131"/>
-                  </a:cubicBezTo>
-                  <a:cubicBezTo>
-                    <a:pt x="9257" y="6185"/>
-                    <a:pt x="9016" y="7399"/>
-                    <a:pt x="8206" y="8206"/>
-                  </a:cubicBezTo>
-                  <a:cubicBezTo>
-                    <a:pt x="7666" y="8748"/>
-                    <a:pt x="6945" y="9035"/>
-                    <a:pt x="6210" y="9035"/>
-                  </a:cubicBezTo>
-                  <a:cubicBezTo>
-                    <a:pt x="5847" y="9035"/>
-                    <a:pt x="5481" y="8965"/>
-                    <a:pt x="5132" y="8820"/>
-                  </a:cubicBezTo>
-                  <a:cubicBezTo>
-                    <a:pt x="4075" y="8383"/>
-                    <a:pt x="3388" y="7354"/>
-                    <a:pt x="3388" y="6212"/>
-                  </a:cubicBezTo>
-                  <a:cubicBezTo>
-                    <a:pt x="3391" y="4652"/>
-                    <a:pt x="4653" y="3391"/>
-                    <a:pt x="6213" y="3388"/>
-                  </a:cubicBezTo>
-                  <a:close/>
-                  <a:moveTo>
-                    <a:pt x="6213" y="0"/>
-                  </a:moveTo>
-                  <a:cubicBezTo>
-                    <a:pt x="2825" y="0"/>
-                    <a:pt x="1" y="2728"/>
-                    <a:pt x="1" y="6212"/>
-                  </a:cubicBezTo>
-                  <a:cubicBezTo>
-                    <a:pt x="1" y="7537"/>
-                    <a:pt x="398" y="8718"/>
-                    <a:pt x="1163" y="9826"/>
-                  </a:cubicBezTo>
-                  <a:lnTo>
-                    <a:pt x="5737" y="16959"/>
-                  </a:lnTo>
-                  <a:cubicBezTo>
-                    <a:pt x="5847" y="17134"/>
-                    <a:pt x="6029" y="17221"/>
-                    <a:pt x="6211" y="17221"/>
-                  </a:cubicBezTo>
-                  <a:cubicBezTo>
-                    <a:pt x="6394" y="17221"/>
-                    <a:pt x="6576" y="17134"/>
-                    <a:pt x="6686" y="16959"/>
-                  </a:cubicBezTo>
-                  <a:lnTo>
-                    <a:pt x="11278" y="9802"/>
-                  </a:lnTo>
-                  <a:cubicBezTo>
-                    <a:pt x="12025" y="8751"/>
-                    <a:pt x="12425" y="7498"/>
-                    <a:pt x="12422" y="6212"/>
-                  </a:cubicBezTo>
-                  <a:cubicBezTo>
-                    <a:pt x="12422" y="2786"/>
-                    <a:pt x="9637" y="0"/>
-                    <a:pt x="6213" y="0"/>
-                  </a:cubicBezTo>
-                  <a:close/>
-                </a:path>
-              </a:pathLst>
-            </a:custGeom>
-            <a:solidFill>
-              <a:srgbClr val="A9ABAA"/>
-            </a:solidFill>
-            <a:ln>
-              <a:noFill/>
-            </a:ln>
-          </p:spPr>
-          <p:txBody>
-            <a:bodyPr spcFirstLastPara="1" wrap="square" lIns="91425" tIns="91425" rIns="91425" bIns="91425" anchor="ctr" anchorCtr="0">
-              <a:noAutofit/>
-            </a:bodyPr>
-            <a:lstStyle/>
-            <a:p>
-              <a:pPr marL="0" lvl="0" indent="0" algn="ctr" rtl="0">
-                <a:spcBef>
-                  <a:spcPts val="0"/>
-                </a:spcBef>
-                <a:spcAft>
-                  <a:spcPts val="0"/>
-                </a:spcAft>
-                <a:buNone/>
-              </a:pPr>
-              <a:endParaRPr sz="1400">
-                <a:solidFill>
-                  <a:srgbClr val="435D74"/>
-                </a:solidFill>
-              </a:endParaRPr>
-            </a:p>
-          </p:txBody>
-        </p:sp>
-        <p:sp>
-          <p:nvSpPr>
-            <p:cNvPr id="310" name="CasellaDiTesto 309">
-              <a:extLst>
-                <a:ext uri="{FF2B5EF4-FFF2-40B4-BE49-F238E27FC236}">
-                  <a16:creationId xmlns:a16="http://schemas.microsoft.com/office/drawing/2014/main" id="{DF5E0CF0-A4C6-4100-B2E4-A0F70BE24414}"/>
-                </a:ext>
-              </a:extLst>
-            </p:cNvPr>
-            <p:cNvSpPr txBox="1"/>
-            <p:nvPr/>
-          </p:nvSpPr>
-          <p:spPr>
-            <a:xfrm>
-              <a:off x="2890832" y="8869522"/>
-              <a:ext cx="1200312" cy="200055"/>
-            </a:xfrm>
-            <a:prstGeom prst="rect">
-              <a:avLst/>
-            </a:prstGeom>
-            <a:noFill/>
-          </p:spPr>
-          <p:txBody>
-            <a:bodyPr wrap="square" rtlCol="0">
-              <a:spAutoFit/>
-            </a:bodyPr>
-            <a:lstStyle/>
-            <a:p>
-              <a:pPr algn="ctr"/>
-              <a:r>
-                <a:rPr lang="it-IT" sz="700" dirty="0">
-                  <a:solidFill>
-                    <a:srgbClr val="A9ABAA"/>
-                  </a:solidFill>
-                  <a:latin typeface="Montserrat Light" panose="00000400000000000000" pitchFamily="2" charset="0"/>
-                </a:rPr>
-                <a:t>Uniba - Economia</a:t>
-              </a:r>
-            </a:p>
-          </p:txBody>
-        </p:sp>
-      </p:grpSp>
-      <p:grpSp>
-        <p:nvGrpSpPr>
-          <p:cNvPr id="353" name="Gruppo 352">
-            <a:extLst>
-              <a:ext uri="{FF2B5EF4-FFF2-40B4-BE49-F238E27FC236}">
-                <a16:creationId xmlns:a16="http://schemas.microsoft.com/office/drawing/2014/main" id="{62CEB136-DFDD-433B-A7B3-932D92364487}"/>
-              </a:ext>
-            </a:extLst>
-          </p:cNvPr>
-          <p:cNvGrpSpPr/>
-          <p:nvPr/>
-        </p:nvGrpSpPr>
-        <p:grpSpPr>
-          <a:xfrm>
-            <a:off x="5422292" y="8107477"/>
-            <a:ext cx="1454313" cy="996846"/>
-            <a:chOff x="2756060" y="8072731"/>
-            <a:chExt cx="1454313" cy="996846"/>
-          </a:xfrm>
-        </p:grpSpPr>
-        <p:sp>
-          <p:nvSpPr>
-            <p:cNvPr id="354" name="Ovale 353">
-              <a:extLst>
-                <a:ext uri="{FF2B5EF4-FFF2-40B4-BE49-F238E27FC236}">
-                  <a16:creationId xmlns:a16="http://schemas.microsoft.com/office/drawing/2014/main" id="{5C3CF711-F6EC-4441-8C0D-0ECB2DDC1634}"/>
-                </a:ext>
-              </a:extLst>
-            </p:cNvPr>
-            <p:cNvSpPr/>
-            <p:nvPr/>
-          </p:nvSpPr>
-          <p:spPr>
-            <a:xfrm>
-              <a:off x="3442015" y="8072731"/>
-              <a:ext cx="82402" cy="82402"/>
-            </a:xfrm>
-            <a:prstGeom prst="ellipse">
-              <a:avLst/>
-            </a:prstGeom>
-            <a:solidFill>
-              <a:srgbClr val="862121"/>
-            </a:solidFill>
-            <a:ln>
-              <a:noFill/>
-            </a:ln>
-          </p:spPr>
-          <p:style>
-            <a:lnRef idx="2">
-              <a:schemeClr val="accent1">
-                <a:shade val="50000"/>
-              </a:schemeClr>
-            </a:lnRef>
-            <a:fillRef idx="1">
-              <a:schemeClr val="accent1"/>
-            </a:fillRef>
-            <a:effectRef idx="0">
-              <a:schemeClr val="accent1"/>
-            </a:effectRef>
-            <a:fontRef idx="minor">
-              <a:schemeClr val="lt1"/>
-            </a:fontRef>
-          </p:style>
-          <p:txBody>
-            <a:bodyPr rtlCol="0" anchor="ctr"/>
-            <a:lstStyle/>
-            <a:p>
-              <a:pPr algn="ctr"/>
-              <a:endParaRPr lang="it-IT"/>
-            </a:p>
-          </p:txBody>
-        </p:sp>
-        <p:sp>
-          <p:nvSpPr>
-            <p:cNvPr id="355" name="CasellaDiTesto 354">
-              <a:extLst>
-                <a:ext uri="{FF2B5EF4-FFF2-40B4-BE49-F238E27FC236}">
-                  <a16:creationId xmlns:a16="http://schemas.microsoft.com/office/drawing/2014/main" id="{28388973-C5B3-43C0-8C8F-152EDA15164E}"/>
-                </a:ext>
-              </a:extLst>
-            </p:cNvPr>
-            <p:cNvSpPr txBox="1"/>
-            <p:nvPr/>
-          </p:nvSpPr>
-          <p:spPr>
-            <a:xfrm>
-              <a:off x="3141980" y="8446679"/>
-              <a:ext cx="682473" cy="200055"/>
-            </a:xfrm>
-            <a:prstGeom prst="rect">
-              <a:avLst/>
-            </a:prstGeom>
-            <a:noFill/>
-          </p:spPr>
-          <p:txBody>
-            <a:bodyPr wrap="square" rtlCol="0">
-              <a:spAutoFit/>
-            </a:bodyPr>
-            <a:lstStyle/>
-            <a:p>
-              <a:pPr algn="ctr"/>
-              <a:r>
-                <a:rPr lang="it-IT" sz="700" dirty="0">
-                  <a:latin typeface="Montserrat Light" panose="00000400000000000000" pitchFamily="2" charset="0"/>
-                </a:rPr>
-                <a:t>2006 - 2011</a:t>
-              </a:r>
-            </a:p>
-          </p:txBody>
-        </p:sp>
-        <p:sp>
-          <p:nvSpPr>
-            <p:cNvPr id="356" name="CasellaDiTesto 355">
-              <a:extLst>
-                <a:ext uri="{FF2B5EF4-FFF2-40B4-BE49-F238E27FC236}">
-                  <a16:creationId xmlns:a16="http://schemas.microsoft.com/office/drawing/2014/main" id="{EC73329F-2942-44CE-AB5A-55CB5D48002B}"/>
-                </a:ext>
-              </a:extLst>
-            </p:cNvPr>
-            <p:cNvSpPr txBox="1"/>
-            <p:nvPr/>
-          </p:nvSpPr>
-          <p:spPr>
-            <a:xfrm>
-              <a:off x="2756060" y="8156915"/>
-              <a:ext cx="1454313" cy="230832"/>
-            </a:xfrm>
-            <a:prstGeom prst="rect">
-              <a:avLst/>
-            </a:prstGeom>
-            <a:noFill/>
-          </p:spPr>
-          <p:txBody>
-            <a:bodyPr wrap="square" rtlCol="0">
-              <a:spAutoFit/>
-            </a:bodyPr>
-            <a:lstStyle/>
-            <a:p>
-              <a:pPr algn="ctr"/>
-              <a:r>
-                <a:rPr lang="en-US" sz="900" dirty="0" err="1">
-                  <a:solidFill>
-                    <a:srgbClr val="5A5A5A"/>
-                  </a:solidFill>
-                  <a:latin typeface="Montserrat SemiBold" panose="00000700000000000000" pitchFamily="2" charset="0"/>
-                </a:rPr>
-                <a:t>Liceo</a:t>
-              </a:r>
-              <a:r>
-                <a:rPr lang="en-US" sz="900" dirty="0">
-                  <a:solidFill>
-                    <a:srgbClr val="5A5A5A"/>
-                  </a:solidFill>
-                  <a:latin typeface="Montserrat SemiBold" panose="00000700000000000000" pitchFamily="2" charset="0"/>
-                </a:rPr>
-                <a:t> </a:t>
-              </a:r>
-              <a:r>
-                <a:rPr lang="en-US" sz="900" dirty="0" err="1">
-                  <a:solidFill>
-                    <a:srgbClr val="5A5A5A"/>
-                  </a:solidFill>
-                  <a:latin typeface="Montserrat SemiBold" panose="00000700000000000000" pitchFamily="2" charset="0"/>
-                </a:rPr>
-                <a:t>Scientifico</a:t>
-              </a:r>
-              <a:endParaRPr lang="en-US" sz="900" dirty="0">
-                <a:solidFill>
-                  <a:srgbClr val="5A5A5A"/>
-                </a:solidFill>
-                <a:latin typeface="Montserrat SemiBold" panose="00000700000000000000" pitchFamily="2" charset="0"/>
-              </a:endParaRPr>
-            </a:p>
-          </p:txBody>
-        </p:sp>
-        <p:sp>
-          <p:nvSpPr>
-            <p:cNvPr id="357" name="Google Shape;4016;p36">
-              <a:extLst>
-                <a:ext uri="{FF2B5EF4-FFF2-40B4-BE49-F238E27FC236}">
-                  <a16:creationId xmlns:a16="http://schemas.microsoft.com/office/drawing/2014/main" id="{CB8A7C55-C9A1-42EF-8EC4-D27AD29892DF}"/>
-                </a:ext>
-              </a:extLst>
-            </p:cNvPr>
-            <p:cNvSpPr/>
-            <p:nvPr/>
-          </p:nvSpPr>
-          <p:spPr>
-            <a:xfrm>
-              <a:off x="3446034" y="8759971"/>
-              <a:ext cx="74364" cy="103066"/>
-            </a:xfrm>
-            <a:custGeom>
-              <a:avLst/>
-              <a:gdLst/>
-              <a:ahLst/>
-              <a:cxnLst/>
-              <a:rect l="l" t="t" r="r" b="b"/>
-              <a:pathLst>
-                <a:path w="12426" h="17222" extrusionOk="0">
-                  <a:moveTo>
-                    <a:pt x="6213" y="3388"/>
-                  </a:moveTo>
-                  <a:cubicBezTo>
-                    <a:pt x="7354" y="3388"/>
-                    <a:pt x="8384" y="4074"/>
-                    <a:pt x="8821" y="5131"/>
-                  </a:cubicBezTo>
-                  <a:cubicBezTo>
-                    <a:pt x="9257" y="6185"/>
-                    <a:pt x="9016" y="7399"/>
-                    <a:pt x="8206" y="8206"/>
-                  </a:cubicBezTo>
-                  <a:cubicBezTo>
-                    <a:pt x="7666" y="8748"/>
-                    <a:pt x="6945" y="9035"/>
-                    <a:pt x="6210" y="9035"/>
-                  </a:cubicBezTo>
-                  <a:cubicBezTo>
-                    <a:pt x="5847" y="9035"/>
-                    <a:pt x="5481" y="8965"/>
-                    <a:pt x="5132" y="8820"/>
-                  </a:cubicBezTo>
-                  <a:cubicBezTo>
-                    <a:pt x="4075" y="8383"/>
-                    <a:pt x="3388" y="7354"/>
-                    <a:pt x="3388" y="6212"/>
-                  </a:cubicBezTo>
-                  <a:cubicBezTo>
-                    <a:pt x="3391" y="4652"/>
-                    <a:pt x="4653" y="3391"/>
-                    <a:pt x="6213" y="3388"/>
-                  </a:cubicBezTo>
-                  <a:close/>
-                  <a:moveTo>
-                    <a:pt x="6213" y="0"/>
-                  </a:moveTo>
-                  <a:cubicBezTo>
-                    <a:pt x="2825" y="0"/>
-                    <a:pt x="1" y="2728"/>
-                    <a:pt x="1" y="6212"/>
-                  </a:cubicBezTo>
-                  <a:cubicBezTo>
-                    <a:pt x="1" y="7537"/>
-                    <a:pt x="398" y="8718"/>
-                    <a:pt x="1163" y="9826"/>
-                  </a:cubicBezTo>
-                  <a:lnTo>
-                    <a:pt x="5737" y="16959"/>
-                  </a:lnTo>
-                  <a:cubicBezTo>
-                    <a:pt x="5847" y="17134"/>
-                    <a:pt x="6029" y="17221"/>
-                    <a:pt x="6211" y="17221"/>
-                  </a:cubicBezTo>
-                  <a:cubicBezTo>
-                    <a:pt x="6394" y="17221"/>
-                    <a:pt x="6576" y="17134"/>
-                    <a:pt x="6686" y="16959"/>
-                  </a:cubicBezTo>
-                  <a:lnTo>
-                    <a:pt x="11278" y="9802"/>
-                  </a:lnTo>
-                  <a:cubicBezTo>
-                    <a:pt x="12025" y="8751"/>
-                    <a:pt x="12425" y="7498"/>
-                    <a:pt x="12422" y="6212"/>
-                  </a:cubicBezTo>
-                  <a:cubicBezTo>
-                    <a:pt x="12422" y="2786"/>
-                    <a:pt x="9637" y="0"/>
-                    <a:pt x="6213" y="0"/>
-                  </a:cubicBezTo>
-                  <a:close/>
-                </a:path>
-              </a:pathLst>
-            </a:custGeom>
-            <a:solidFill>
-              <a:srgbClr val="A9ABAA"/>
-            </a:solidFill>
-            <a:ln>
-              <a:noFill/>
-            </a:ln>
-          </p:spPr>
-          <p:txBody>
-            <a:bodyPr spcFirstLastPara="1" wrap="square" lIns="91425" tIns="91425" rIns="91425" bIns="91425" anchor="ctr" anchorCtr="0">
-              <a:noAutofit/>
-            </a:bodyPr>
-            <a:lstStyle/>
-            <a:p>
-              <a:pPr marL="0" lvl="0" indent="0" algn="ctr" rtl="0">
-                <a:spcBef>
-                  <a:spcPts val="0"/>
-                </a:spcBef>
-                <a:spcAft>
-                  <a:spcPts val="0"/>
-                </a:spcAft>
-                <a:buNone/>
-              </a:pPr>
-              <a:endParaRPr sz="1400">
-                <a:solidFill>
-                  <a:srgbClr val="435D74"/>
-                </a:solidFill>
-              </a:endParaRPr>
-            </a:p>
-          </p:txBody>
-        </p:sp>
-        <p:sp>
-          <p:nvSpPr>
-            <p:cNvPr id="358" name="CasellaDiTesto 357">
-              <a:extLst>
-                <a:ext uri="{FF2B5EF4-FFF2-40B4-BE49-F238E27FC236}">
-                  <a16:creationId xmlns:a16="http://schemas.microsoft.com/office/drawing/2014/main" id="{AA97A76A-2B55-4B67-B557-8650964A9DF6}"/>
-                </a:ext>
-              </a:extLst>
-            </p:cNvPr>
-            <p:cNvSpPr txBox="1"/>
-            <p:nvPr/>
-          </p:nvSpPr>
-          <p:spPr>
-            <a:xfrm>
-              <a:off x="2789665" y="8869522"/>
-              <a:ext cx="1385276" cy="200055"/>
-            </a:xfrm>
-            <a:prstGeom prst="rect">
-              <a:avLst/>
-            </a:prstGeom>
-            <a:noFill/>
-          </p:spPr>
-          <p:txBody>
-            <a:bodyPr wrap="square" rtlCol="0">
-              <a:spAutoFit/>
-            </a:bodyPr>
-            <a:lstStyle/>
-            <a:p>
-              <a:pPr algn="ctr"/>
-              <a:r>
-                <a:rPr lang="it-IT" sz="700" dirty="0">
-                  <a:solidFill>
-                    <a:srgbClr val="A9ABAA"/>
-                  </a:solidFill>
-                  <a:latin typeface="Montserrat Light" panose="00000400000000000000" pitchFamily="2" charset="0"/>
-                </a:rPr>
-                <a:t>Liceo – E. Fermi </a:t>
-              </a:r>
-            </a:p>
-          </p:txBody>
-        </p:sp>
-      </p:grpSp>
-      <p:cxnSp>
-        <p:nvCxnSpPr>
-          <p:cNvPr id="359" name="Connettore diritto 358">
-            <a:extLst>
-              <a:ext uri="{FF2B5EF4-FFF2-40B4-BE49-F238E27FC236}">
-                <a16:creationId xmlns:a16="http://schemas.microsoft.com/office/drawing/2014/main" id="{8E61B273-6EB7-4E09-B8D1-0F355D59EB91}"/>
-              </a:ext>
-            </a:extLst>
-          </p:cNvPr>
-          <p:cNvCxnSpPr>
-            <a:cxnSpLocks/>
-            <a:stCxn id="354" idx="2"/>
-            <a:endCxn id="304" idx="6"/>
-          </p:cNvCxnSpPr>
-          <p:nvPr/>
-        </p:nvCxnSpPr>
-        <p:spPr>
-          <a:xfrm flipH="1">
-            <a:off x="3309937" y="8148678"/>
-            <a:ext cx="2798310" cy="0"/>
-          </a:xfrm>
-          <a:prstGeom prst="line">
-            <a:avLst/>
-          </a:prstGeom>
-          <a:ln w="9525">
-            <a:solidFill>
-              <a:srgbClr val="C9C9C9"/>
-            </a:solidFill>
-            <a:prstDash val="sysDot"/>
-          </a:ln>
-        </p:spPr>
-        <p:style>
-          <a:lnRef idx="1">
-            <a:schemeClr val="accent1"/>
-          </a:lnRef>
-          <a:fillRef idx="0">
-            <a:schemeClr val="accent1"/>
-          </a:fillRef>
-          <a:effectRef idx="0">
-            <a:schemeClr val="accent1"/>
-          </a:effectRef>
-          <a:fontRef idx="minor">
-            <a:schemeClr val="tx1"/>
-          </a:fontRef>
-        </p:style>
-      </p:cxnSp>
-      <p:grpSp>
-        <p:nvGrpSpPr>
-          <p:cNvPr id="347" name="Gruppo 346">
-            <a:extLst>
-              <a:ext uri="{FF2B5EF4-FFF2-40B4-BE49-F238E27FC236}">
-                <a16:creationId xmlns:a16="http://schemas.microsoft.com/office/drawing/2014/main" id="{E94B6D17-36F8-44FA-8EAD-8CF718958E98}"/>
-              </a:ext>
-            </a:extLst>
-          </p:cNvPr>
-          <p:cNvGrpSpPr/>
-          <p:nvPr/>
-        </p:nvGrpSpPr>
-        <p:grpSpPr>
-          <a:xfrm>
-            <a:off x="3836999" y="8107477"/>
-            <a:ext cx="1759730" cy="996846"/>
-            <a:chOff x="2611123" y="8072731"/>
-            <a:chExt cx="1759730" cy="996846"/>
-          </a:xfrm>
-        </p:grpSpPr>
-        <p:sp>
-          <p:nvSpPr>
-            <p:cNvPr id="349" name="CasellaDiTesto 348">
-              <a:extLst>
-                <a:ext uri="{FF2B5EF4-FFF2-40B4-BE49-F238E27FC236}">
-                  <a16:creationId xmlns:a16="http://schemas.microsoft.com/office/drawing/2014/main" id="{3CC65073-A3B5-4600-A293-2BC36340AC23}"/>
-                </a:ext>
-              </a:extLst>
-            </p:cNvPr>
-            <p:cNvSpPr txBox="1"/>
-            <p:nvPr/>
-          </p:nvSpPr>
-          <p:spPr>
-            <a:xfrm>
-              <a:off x="3141980" y="8446679"/>
-              <a:ext cx="682473" cy="200055"/>
-            </a:xfrm>
-            <a:prstGeom prst="rect">
-              <a:avLst/>
-            </a:prstGeom>
-            <a:noFill/>
-          </p:spPr>
-          <p:txBody>
-            <a:bodyPr wrap="square" rtlCol="0">
-              <a:spAutoFit/>
-            </a:bodyPr>
-            <a:lstStyle/>
-            <a:p>
-              <a:pPr algn="ctr"/>
-              <a:r>
-                <a:rPr lang="it-IT" sz="700" dirty="0">
-                  <a:latin typeface="Montserrat Light" panose="00000400000000000000" pitchFamily="2" charset="0"/>
-                </a:rPr>
-                <a:t>2011 - 2014</a:t>
-              </a:r>
-            </a:p>
-          </p:txBody>
-        </p:sp>
-        <p:sp>
-          <p:nvSpPr>
-            <p:cNvPr id="350" name="CasellaDiTesto 349">
-              <a:extLst>
-                <a:ext uri="{FF2B5EF4-FFF2-40B4-BE49-F238E27FC236}">
-                  <a16:creationId xmlns:a16="http://schemas.microsoft.com/office/drawing/2014/main" id="{2380E90D-CC1E-41C0-BAC0-3891976A76E8}"/>
-                </a:ext>
-              </a:extLst>
-            </p:cNvPr>
-            <p:cNvSpPr txBox="1"/>
-            <p:nvPr/>
-          </p:nvSpPr>
-          <p:spPr>
-            <a:xfrm>
-              <a:off x="2611123" y="8163595"/>
-              <a:ext cx="1759730" cy="369332"/>
-            </a:xfrm>
-            <a:prstGeom prst="rect">
-              <a:avLst/>
-            </a:prstGeom>
-            <a:noFill/>
-          </p:spPr>
-          <p:txBody>
-            <a:bodyPr wrap="square" rtlCol="0">
-              <a:spAutoFit/>
-            </a:bodyPr>
-            <a:lstStyle/>
-            <a:p>
-              <a:pPr algn="ctr"/>
-              <a:r>
-                <a:rPr lang="en-US" sz="900" dirty="0">
-                  <a:solidFill>
-                    <a:srgbClr val="5A5A5A"/>
-                  </a:solidFill>
-                  <a:latin typeface="Montserrat SemiBold" panose="00000700000000000000" pitchFamily="2" charset="0"/>
-                </a:rPr>
-                <a:t>Laurea in Marketing &amp; Comunicazione d’azienda</a:t>
-              </a:r>
-            </a:p>
-          </p:txBody>
-        </p:sp>
-        <p:sp>
-          <p:nvSpPr>
-            <p:cNvPr id="351" name="Google Shape;4016;p36">
-              <a:extLst>
-                <a:ext uri="{FF2B5EF4-FFF2-40B4-BE49-F238E27FC236}">
-                  <a16:creationId xmlns:a16="http://schemas.microsoft.com/office/drawing/2014/main" id="{E877EA4E-0913-40FC-9375-7BB0CDC08DCF}"/>
-                </a:ext>
-              </a:extLst>
-            </p:cNvPr>
-            <p:cNvSpPr/>
-            <p:nvPr/>
-          </p:nvSpPr>
-          <p:spPr>
-            <a:xfrm>
-              <a:off x="3446034" y="8759971"/>
-              <a:ext cx="74364" cy="103066"/>
-            </a:xfrm>
-            <a:custGeom>
-              <a:avLst/>
-              <a:gdLst/>
-              <a:ahLst/>
-              <a:cxnLst/>
-              <a:rect l="l" t="t" r="r" b="b"/>
-              <a:pathLst>
-                <a:path w="12426" h="17222" extrusionOk="0">
-                  <a:moveTo>
-                    <a:pt x="6213" y="3388"/>
-                  </a:moveTo>
-                  <a:cubicBezTo>
-                    <a:pt x="7354" y="3388"/>
-                    <a:pt x="8384" y="4074"/>
-                    <a:pt x="8821" y="5131"/>
-                  </a:cubicBezTo>
-                  <a:cubicBezTo>
-                    <a:pt x="9257" y="6185"/>
-                    <a:pt x="9016" y="7399"/>
-                    <a:pt x="8206" y="8206"/>
-                  </a:cubicBezTo>
-                  <a:cubicBezTo>
-                    <a:pt x="7666" y="8748"/>
-                    <a:pt x="6945" y="9035"/>
-                    <a:pt x="6210" y="9035"/>
-                  </a:cubicBezTo>
-                  <a:cubicBezTo>
-                    <a:pt x="5847" y="9035"/>
-                    <a:pt x="5481" y="8965"/>
-                    <a:pt x="5132" y="8820"/>
-                  </a:cubicBezTo>
-                  <a:cubicBezTo>
-                    <a:pt x="4075" y="8383"/>
-                    <a:pt x="3388" y="7354"/>
-                    <a:pt x="3388" y="6212"/>
-                  </a:cubicBezTo>
-                  <a:cubicBezTo>
-                    <a:pt x="3391" y="4652"/>
-                    <a:pt x="4653" y="3391"/>
-                    <a:pt x="6213" y="3388"/>
-                  </a:cubicBezTo>
-                  <a:close/>
-                  <a:moveTo>
-                    <a:pt x="6213" y="0"/>
-                  </a:moveTo>
-                  <a:cubicBezTo>
-                    <a:pt x="2825" y="0"/>
-                    <a:pt x="1" y="2728"/>
-                    <a:pt x="1" y="6212"/>
-                  </a:cubicBezTo>
-                  <a:cubicBezTo>
-                    <a:pt x="1" y="7537"/>
-                    <a:pt x="398" y="8718"/>
-                    <a:pt x="1163" y="9826"/>
-                  </a:cubicBezTo>
-                  <a:lnTo>
-                    <a:pt x="5737" y="16959"/>
-                  </a:lnTo>
-                  <a:cubicBezTo>
-                    <a:pt x="5847" y="17134"/>
-                    <a:pt x="6029" y="17221"/>
-                    <a:pt x="6211" y="17221"/>
-                  </a:cubicBezTo>
-                  <a:cubicBezTo>
-                    <a:pt x="6394" y="17221"/>
-                    <a:pt x="6576" y="17134"/>
-                    <a:pt x="6686" y="16959"/>
-                  </a:cubicBezTo>
-                  <a:lnTo>
-                    <a:pt x="11278" y="9802"/>
-                  </a:lnTo>
-                  <a:cubicBezTo>
-                    <a:pt x="12025" y="8751"/>
-                    <a:pt x="12425" y="7498"/>
-                    <a:pt x="12422" y="6212"/>
-                  </a:cubicBezTo>
-                  <a:cubicBezTo>
-                    <a:pt x="12422" y="2786"/>
-                    <a:pt x="9637" y="0"/>
-                    <a:pt x="6213" y="0"/>
-                  </a:cubicBezTo>
-                  <a:close/>
-                </a:path>
-              </a:pathLst>
-            </a:custGeom>
-            <a:solidFill>
-              <a:srgbClr val="A9ABAA"/>
-            </a:solidFill>
-            <a:ln>
-              <a:noFill/>
-            </a:ln>
-          </p:spPr>
-          <p:txBody>
-            <a:bodyPr spcFirstLastPara="1" wrap="square" lIns="91425" tIns="91425" rIns="91425" bIns="91425" anchor="ctr" anchorCtr="0">
-              <a:noAutofit/>
-            </a:bodyPr>
-            <a:lstStyle/>
-            <a:p>
-              <a:pPr marL="0" lvl="0" indent="0" algn="ctr" rtl="0">
-                <a:spcBef>
-                  <a:spcPts val="0"/>
-                </a:spcBef>
-                <a:spcAft>
-                  <a:spcPts val="0"/>
-                </a:spcAft>
-                <a:buNone/>
-              </a:pPr>
-              <a:endParaRPr sz="1400">
-                <a:solidFill>
-                  <a:srgbClr val="435D74"/>
-                </a:solidFill>
-              </a:endParaRPr>
-            </a:p>
-          </p:txBody>
-        </p:sp>
-        <p:sp>
-          <p:nvSpPr>
-            <p:cNvPr id="352" name="CasellaDiTesto 351">
-              <a:extLst>
-                <a:ext uri="{FF2B5EF4-FFF2-40B4-BE49-F238E27FC236}">
-                  <a16:creationId xmlns:a16="http://schemas.microsoft.com/office/drawing/2014/main" id="{8A56892E-9962-4813-B875-687C552B5CE9}"/>
-                </a:ext>
-              </a:extLst>
-            </p:cNvPr>
-            <p:cNvSpPr txBox="1"/>
-            <p:nvPr/>
-          </p:nvSpPr>
-          <p:spPr>
-            <a:xfrm>
-              <a:off x="2890832" y="8869522"/>
-              <a:ext cx="1200312" cy="200055"/>
-            </a:xfrm>
-            <a:prstGeom prst="rect">
-              <a:avLst/>
-            </a:prstGeom>
-            <a:noFill/>
-          </p:spPr>
-          <p:txBody>
-            <a:bodyPr wrap="square" rtlCol="0">
-              <a:spAutoFit/>
-            </a:bodyPr>
-            <a:lstStyle/>
-            <a:p>
-              <a:pPr algn="ctr"/>
-              <a:r>
-                <a:rPr lang="it-IT" sz="700" dirty="0">
-                  <a:solidFill>
-                    <a:srgbClr val="A9ABAA"/>
-                  </a:solidFill>
-                  <a:latin typeface="Montserrat Light" panose="00000400000000000000" pitchFamily="2" charset="0"/>
-                </a:rPr>
-                <a:t>Uniba - Economia</a:t>
-              </a:r>
-            </a:p>
-          </p:txBody>
-        </p:sp>
-        <p:sp>
-          <p:nvSpPr>
-            <p:cNvPr id="348" name="Ovale 347">
-              <a:extLst>
-                <a:ext uri="{FF2B5EF4-FFF2-40B4-BE49-F238E27FC236}">
-                  <a16:creationId xmlns:a16="http://schemas.microsoft.com/office/drawing/2014/main" id="{E4CF0D8E-1D4D-4F40-9A62-02605FB88DDD}"/>
-                </a:ext>
-              </a:extLst>
-            </p:cNvPr>
-            <p:cNvSpPr/>
-            <p:nvPr/>
-          </p:nvSpPr>
-          <p:spPr>
-            <a:xfrm>
-              <a:off x="3442015" y="8072731"/>
-              <a:ext cx="82402" cy="82402"/>
-            </a:xfrm>
-            <a:prstGeom prst="ellipse">
-              <a:avLst/>
-            </a:prstGeom>
-            <a:solidFill>
-              <a:srgbClr val="862121"/>
-            </a:solidFill>
-            <a:ln>
-              <a:noFill/>
-            </a:ln>
-          </p:spPr>
-          <p:style>
-            <a:lnRef idx="2">
-              <a:schemeClr val="accent1">
-                <a:shade val="50000"/>
-              </a:schemeClr>
-            </a:lnRef>
-            <a:fillRef idx="1">
-              <a:schemeClr val="accent1"/>
-            </a:fillRef>
-            <a:effectRef idx="0">
-              <a:schemeClr val="accent1"/>
-            </a:effectRef>
-            <a:fontRef idx="minor">
-              <a:schemeClr val="lt1"/>
-            </a:fontRef>
-          </p:style>
-          <p:txBody>
-            <a:bodyPr rtlCol="0" anchor="ctr"/>
-            <a:lstStyle/>
-            <a:p>
-              <a:pPr algn="ctr"/>
-              <a:endParaRPr lang="it-IT"/>
-            </a:p>
-          </p:txBody>
-        </p:sp>
-      </p:grpSp>
-      <p:cxnSp>
-        <p:nvCxnSpPr>
-          <p:cNvPr id="366" name="Connettore diritto 365">
-            <a:extLst>
-              <a:ext uri="{FF2B5EF4-FFF2-40B4-BE49-F238E27FC236}">
-                <a16:creationId xmlns:a16="http://schemas.microsoft.com/office/drawing/2014/main" id="{A0B66505-2A1D-4A8C-B66F-2ACF1045662F}"/>
-              </a:ext>
-            </a:extLst>
-          </p:cNvPr>
-          <p:cNvCxnSpPr>
-            <a:cxnSpLocks/>
-          </p:cNvCxnSpPr>
-          <p:nvPr/>
-        </p:nvCxnSpPr>
-        <p:spPr>
-          <a:xfrm>
-            <a:off x="2852738" y="9161446"/>
-            <a:ext cx="3756580" cy="0"/>
-          </a:xfrm>
-          <a:prstGeom prst="line">
-            <a:avLst/>
-          </a:prstGeom>
-          <a:ln w="25400">
-            <a:solidFill>
-              <a:srgbClr val="A9ABAA"/>
-            </a:solidFill>
-          </a:ln>
-        </p:spPr>
-        <p:style>
-          <a:lnRef idx="1">
-            <a:schemeClr val="accent1"/>
-          </a:lnRef>
-          <a:fillRef idx="0">
-            <a:schemeClr val="accent1"/>
-          </a:fillRef>
-          <a:effectRef idx="0">
-            <a:schemeClr val="accent1"/>
-          </a:effectRef>
-          <a:fontRef idx="minor">
-            <a:schemeClr val="tx1"/>
-          </a:fontRef>
-        </p:style>
-      </p:cxnSp>
       <p:grpSp>
         <p:nvGrpSpPr>
           <p:cNvPr id="3" name="Gruppo 2">
@@ -15286,7 +14139,7 @@
         </p:nvGrpSpPr>
         <p:grpSpPr>
           <a:xfrm>
-            <a:off x="3823246" y="863140"/>
+            <a:off x="3823246" y="742490"/>
             <a:ext cx="790316" cy="63589"/>
             <a:chOff x="3322013" y="2620872"/>
             <a:chExt cx="790316" cy="63589"/>
@@ -15671,7 +14524,7 @@
         </p:nvGrpSpPr>
         <p:grpSpPr>
           <a:xfrm>
-            <a:off x="3823246" y="1043542"/>
+            <a:off x="3823246" y="922892"/>
             <a:ext cx="790316" cy="63589"/>
             <a:chOff x="3322013" y="2620872"/>
             <a:chExt cx="790316" cy="63589"/>
@@ -16056,7 +14909,7 @@
         </p:nvGrpSpPr>
         <p:grpSpPr>
           <a:xfrm>
-            <a:off x="3823246" y="1223944"/>
+            <a:off x="3823246" y="1103294"/>
             <a:ext cx="790316" cy="63589"/>
             <a:chOff x="3322013" y="2620872"/>
             <a:chExt cx="790316" cy="63589"/>
@@ -16441,7 +15294,7 @@
         </p:nvGrpSpPr>
         <p:grpSpPr>
           <a:xfrm>
-            <a:off x="3823246" y="1404346"/>
+            <a:off x="3823246" y="1283696"/>
             <a:ext cx="790316" cy="63589"/>
             <a:chOff x="3322013" y="2620872"/>
             <a:chExt cx="790316" cy="63589"/>
@@ -16826,7 +15679,7 @@
         </p:nvGrpSpPr>
         <p:grpSpPr>
           <a:xfrm>
-            <a:off x="3823246" y="1584747"/>
+            <a:off x="3823246" y="1464097"/>
             <a:ext cx="790316" cy="63589"/>
             <a:chOff x="3322013" y="2620872"/>
             <a:chExt cx="790316" cy="63589"/>
@@ -17211,7 +16064,7 @@
         </p:nvSpPr>
         <p:spPr>
           <a:xfrm>
-            <a:off x="5893600" y="742620"/>
+            <a:off x="5893600" y="621970"/>
             <a:ext cx="547956" cy="256224"/>
           </a:xfrm>
           <a:prstGeom prst="rect">
@@ -17253,7 +16106,7 @@
         </p:nvSpPr>
         <p:spPr>
           <a:xfrm>
-            <a:off x="4875285" y="1472209"/>
+            <a:off x="4875285" y="1351559"/>
             <a:ext cx="751728" cy="256224"/>
           </a:xfrm>
           <a:prstGeom prst="rect">
@@ -17295,7 +16148,7 @@
         </p:nvSpPr>
         <p:spPr>
           <a:xfrm>
-            <a:off x="5720672" y="1455471"/>
+            <a:off x="5720672" y="1334821"/>
             <a:ext cx="893812" cy="256224"/>
           </a:xfrm>
           <a:prstGeom prst="rect">
@@ -17337,7 +16190,7 @@
         </p:nvSpPr>
         <p:spPr>
           <a:xfrm>
-            <a:off x="5156464" y="1017120"/>
+            <a:off x="5156464" y="896470"/>
             <a:ext cx="197313" cy="194932"/>
           </a:xfrm>
           <a:custGeom>
@@ -17645,7 +16498,7 @@
         </p:nvGrpSpPr>
         <p:grpSpPr>
           <a:xfrm>
-            <a:off x="6065744" y="1011303"/>
+            <a:off x="6065744" y="890653"/>
             <a:ext cx="203668" cy="210412"/>
             <a:chOff x="-62148000" y="1930075"/>
             <a:chExt cx="309550" cy="319800"/>
@@ -18169,7 +17022,7 @@
         </p:nvSpPr>
         <p:spPr>
           <a:xfrm>
-            <a:off x="5168619" y="1329580"/>
+            <a:off x="5168619" y="1208930"/>
             <a:ext cx="187367" cy="175655"/>
           </a:xfrm>
           <a:custGeom>
@@ -18413,7 +17266,7 @@
         </p:nvGrpSpPr>
         <p:grpSpPr>
           <a:xfrm>
-            <a:off x="6071638" y="1317175"/>
+            <a:off x="6071638" y="1196525"/>
             <a:ext cx="199388" cy="169105"/>
             <a:chOff x="-46033225" y="1982825"/>
             <a:chExt cx="300900" cy="263900"/>
@@ -18888,8 +17741,8 @@
         </p:nvSpPr>
         <p:spPr>
           <a:xfrm>
-            <a:off x="2852738" y="9233024"/>
-            <a:ext cx="3756580" cy="584775"/>
+            <a:off x="2852738" y="9294943"/>
+            <a:ext cx="3756580" cy="523220"/>
           </a:xfrm>
           <a:prstGeom prst="rect">
             <a:avLst/>
@@ -18904,7 +17757,7 @@
           <a:p>
             <a:pPr algn="just"/>
             <a:r>
-              <a:rPr lang="it-IT" sz="800" spc="-5" dirty="0">
+              <a:rPr lang="it-IT" sz="700" spc="-5" dirty="0">
                 <a:solidFill>
                   <a:srgbClr val="000000"/>
                 </a:solidFill>
@@ -19064,100 +17917,2619 @@
           </a:ln>
         </p:spPr>
       </p:pic>
-      <p:pic>
-        <p:nvPicPr>
-          <p:cNvPr id="217" name="Immagine 216">
+      <p:grpSp>
+        <p:nvGrpSpPr>
+          <p:cNvPr id="217" name="Gruppo 216">
             <a:extLst>
               <a:ext uri="{FF2B5EF4-FFF2-40B4-BE49-F238E27FC236}">
-                <a16:creationId xmlns:a16="http://schemas.microsoft.com/office/drawing/2014/main" id="{74E62C99-F77E-4AE3-BD11-E9D43176E4E1}"/>
+                <a16:creationId xmlns:a16="http://schemas.microsoft.com/office/drawing/2014/main" id="{8C942870-29FE-4A26-87CF-D45DFC954744}"/>
               </a:ext>
             </a:extLst>
           </p:cNvPr>
-          <p:cNvPicPr>
-            <a:picLocks noChangeAspect="1"/>
-          </p:cNvPicPr>
+          <p:cNvGrpSpPr/>
           <p:nvPr/>
-        </p:nvPicPr>
-        <p:blipFill rotWithShape="1">
-          <a:blip r:embed="rId6">
+        </p:nvGrpSpPr>
+        <p:grpSpPr>
+          <a:xfrm flipH="1">
+            <a:off x="2584174" y="8161794"/>
+            <a:ext cx="4342767" cy="1053969"/>
+            <a:chOff x="2541580" y="8107477"/>
+            <a:chExt cx="4335025" cy="1053969"/>
+          </a:xfrm>
+        </p:grpSpPr>
+        <p:grpSp>
+          <p:nvGrpSpPr>
+            <p:cNvPr id="220" name="Gruppo 219">
+              <a:extLst>
+                <a:ext uri="{FF2B5EF4-FFF2-40B4-BE49-F238E27FC236}">
+                  <a16:creationId xmlns:a16="http://schemas.microsoft.com/office/drawing/2014/main" id="{2534F82C-3C06-42C5-8F81-0CD92AF6976C}"/>
+                </a:ext>
+              </a:extLst>
+            </p:cNvPr>
+            <p:cNvGrpSpPr/>
+            <p:nvPr/>
+          </p:nvGrpSpPr>
+          <p:grpSpPr>
+            <a:xfrm>
+              <a:off x="2541580" y="8107477"/>
+              <a:ext cx="1454313" cy="930164"/>
+              <a:chOff x="2756060" y="8072731"/>
+              <a:chExt cx="1454313" cy="930164"/>
+            </a:xfrm>
+          </p:grpSpPr>
+          <p:sp>
+            <p:nvSpPr>
+              <p:cNvPr id="288" name="Ovale 287">
+                <a:extLst>
+                  <a:ext uri="{FF2B5EF4-FFF2-40B4-BE49-F238E27FC236}">
+                    <a16:creationId xmlns:a16="http://schemas.microsoft.com/office/drawing/2014/main" id="{0BB02386-A482-495B-ACBD-5B32D436FBFA}"/>
+                  </a:ext>
+                </a:extLst>
+              </p:cNvPr>
+              <p:cNvSpPr/>
+              <p:nvPr/>
+            </p:nvSpPr>
+            <p:spPr>
+              <a:xfrm>
+                <a:off x="3442015" y="8072731"/>
+                <a:ext cx="82402" cy="82402"/>
+              </a:xfrm>
+              <a:prstGeom prst="ellipse">
+                <a:avLst/>
+              </a:prstGeom>
+              <a:solidFill>
+                <a:srgbClr val="862121"/>
+              </a:solidFill>
+              <a:ln>
+                <a:noFill/>
+              </a:ln>
+            </p:spPr>
+            <p:style>
+              <a:lnRef idx="2">
+                <a:schemeClr val="accent1">
+                  <a:shade val="50000"/>
+                </a:schemeClr>
+              </a:lnRef>
+              <a:fillRef idx="1">
+                <a:schemeClr val="accent1"/>
+              </a:fillRef>
+              <a:effectRef idx="0">
+                <a:schemeClr val="accent1"/>
+              </a:effectRef>
+              <a:fontRef idx="minor">
+                <a:schemeClr val="lt1"/>
+              </a:fontRef>
+            </p:style>
+            <p:txBody>
+              <a:bodyPr rtlCol="0" anchor="ctr"/>
+              <a:lstStyle/>
+              <a:p>
+                <a:pPr algn="ctr"/>
+                <a:endParaRPr lang="it-IT"/>
+              </a:p>
+            </p:txBody>
+          </p:sp>
+          <p:sp>
+            <p:nvSpPr>
+              <p:cNvPr id="290" name="CasellaDiTesto 289">
+                <a:extLst>
+                  <a:ext uri="{FF2B5EF4-FFF2-40B4-BE49-F238E27FC236}">
+                    <a16:creationId xmlns:a16="http://schemas.microsoft.com/office/drawing/2014/main" id="{DD83810A-6FB6-4EE8-9FC6-E27C4314D6E7}"/>
+                  </a:ext>
+                </a:extLst>
+              </p:cNvPr>
+              <p:cNvSpPr txBox="1"/>
+              <p:nvPr/>
+            </p:nvSpPr>
+            <p:spPr>
+              <a:xfrm>
+                <a:off x="3141980" y="8446679"/>
+                <a:ext cx="682473" cy="200055"/>
+              </a:xfrm>
+              <a:prstGeom prst="rect">
+                <a:avLst/>
+              </a:prstGeom>
+              <a:noFill/>
+            </p:spPr>
+            <p:txBody>
+              <a:bodyPr wrap="square" rtlCol="0">
+                <a:spAutoFit/>
+              </a:bodyPr>
+              <a:lstStyle/>
+              <a:p>
+                <a:pPr algn="ctr"/>
+                <a:r>
+                  <a:rPr lang="it-IT" sz="700" dirty="0">
+                    <a:latin typeface="Montserrat Light" panose="00000400000000000000" pitchFamily="2" charset="0"/>
+                  </a:rPr>
+                  <a:t>2014 - 2016</a:t>
+                </a:r>
+              </a:p>
+            </p:txBody>
+          </p:sp>
+          <p:sp>
+            <p:nvSpPr>
+              <p:cNvPr id="292" name="CasellaDiTesto 291">
+                <a:extLst>
+                  <a:ext uri="{FF2B5EF4-FFF2-40B4-BE49-F238E27FC236}">
+                    <a16:creationId xmlns:a16="http://schemas.microsoft.com/office/drawing/2014/main" id="{E54B6F1B-58E9-472B-9574-DF12499473F2}"/>
+                  </a:ext>
+                </a:extLst>
+              </p:cNvPr>
+              <p:cNvSpPr txBox="1"/>
+              <p:nvPr/>
+            </p:nvSpPr>
+            <p:spPr>
+              <a:xfrm>
+                <a:off x="2756060" y="8156915"/>
+                <a:ext cx="1454313" cy="369332"/>
+              </a:xfrm>
+              <a:prstGeom prst="rect">
+                <a:avLst/>
+              </a:prstGeom>
+              <a:noFill/>
+            </p:spPr>
+            <p:txBody>
+              <a:bodyPr wrap="square" rtlCol="0">
+                <a:spAutoFit/>
+              </a:bodyPr>
+              <a:lstStyle/>
+              <a:p>
+                <a:pPr algn="ctr"/>
+                <a:r>
+                  <a:rPr lang="en-US" sz="900" dirty="0">
+                    <a:solidFill>
+                      <a:srgbClr val="5A5A5A"/>
+                    </a:solidFill>
+                    <a:latin typeface="Montserrat SemiBold" panose="00000700000000000000" pitchFamily="2" charset="0"/>
+                  </a:rPr>
+                  <a:t>Specializzazione </a:t>
+                </a:r>
+              </a:p>
+              <a:p>
+                <a:pPr algn="ctr"/>
+                <a:r>
+                  <a:rPr lang="en-US" sz="900" dirty="0">
+                    <a:solidFill>
+                      <a:srgbClr val="5A5A5A"/>
+                    </a:solidFill>
+                    <a:latin typeface="Montserrat SemiBold" panose="00000700000000000000" pitchFamily="2" charset="0"/>
+                  </a:rPr>
+                  <a:t>in Marketing</a:t>
+                </a:r>
+              </a:p>
+            </p:txBody>
+          </p:sp>
+          <p:sp>
+            <p:nvSpPr>
+              <p:cNvPr id="293" name="Google Shape;4016;p36">
+                <a:extLst>
+                  <a:ext uri="{FF2B5EF4-FFF2-40B4-BE49-F238E27FC236}">
+                    <a16:creationId xmlns:a16="http://schemas.microsoft.com/office/drawing/2014/main" id="{C34B5864-8428-4F9B-9777-8D46A4B73924}"/>
+                  </a:ext>
+                </a:extLst>
+              </p:cNvPr>
+              <p:cNvSpPr/>
+              <p:nvPr/>
+            </p:nvSpPr>
+            <p:spPr>
+              <a:xfrm>
+                <a:off x="3446034" y="8693289"/>
+                <a:ext cx="74364" cy="103066"/>
+              </a:xfrm>
+              <a:custGeom>
+                <a:avLst/>
+                <a:gdLst/>
+                <a:ahLst/>
+                <a:cxnLst/>
+                <a:rect l="l" t="t" r="r" b="b"/>
+                <a:pathLst>
+                  <a:path w="12426" h="17222" extrusionOk="0">
+                    <a:moveTo>
+                      <a:pt x="6213" y="3388"/>
+                    </a:moveTo>
+                    <a:cubicBezTo>
+                      <a:pt x="7354" y="3388"/>
+                      <a:pt x="8384" y="4074"/>
+                      <a:pt x="8821" y="5131"/>
+                    </a:cubicBezTo>
+                    <a:cubicBezTo>
+                      <a:pt x="9257" y="6185"/>
+                      <a:pt x="9016" y="7399"/>
+                      <a:pt x="8206" y="8206"/>
+                    </a:cubicBezTo>
+                    <a:cubicBezTo>
+                      <a:pt x="7666" y="8748"/>
+                      <a:pt x="6945" y="9035"/>
+                      <a:pt x="6210" y="9035"/>
+                    </a:cubicBezTo>
+                    <a:cubicBezTo>
+                      <a:pt x="5847" y="9035"/>
+                      <a:pt x="5481" y="8965"/>
+                      <a:pt x="5132" y="8820"/>
+                    </a:cubicBezTo>
+                    <a:cubicBezTo>
+                      <a:pt x="4075" y="8383"/>
+                      <a:pt x="3388" y="7354"/>
+                      <a:pt x="3388" y="6212"/>
+                    </a:cubicBezTo>
+                    <a:cubicBezTo>
+                      <a:pt x="3391" y="4652"/>
+                      <a:pt x="4653" y="3391"/>
+                      <a:pt x="6213" y="3388"/>
+                    </a:cubicBezTo>
+                    <a:close/>
+                    <a:moveTo>
+                      <a:pt x="6213" y="0"/>
+                    </a:moveTo>
+                    <a:cubicBezTo>
+                      <a:pt x="2825" y="0"/>
+                      <a:pt x="1" y="2728"/>
+                      <a:pt x="1" y="6212"/>
+                    </a:cubicBezTo>
+                    <a:cubicBezTo>
+                      <a:pt x="1" y="7537"/>
+                      <a:pt x="398" y="8718"/>
+                      <a:pt x="1163" y="9826"/>
+                    </a:cubicBezTo>
+                    <a:lnTo>
+                      <a:pt x="5737" y="16959"/>
+                    </a:lnTo>
+                    <a:cubicBezTo>
+                      <a:pt x="5847" y="17134"/>
+                      <a:pt x="6029" y="17221"/>
+                      <a:pt x="6211" y="17221"/>
+                    </a:cubicBezTo>
+                    <a:cubicBezTo>
+                      <a:pt x="6394" y="17221"/>
+                      <a:pt x="6576" y="17134"/>
+                      <a:pt x="6686" y="16959"/>
+                    </a:cubicBezTo>
+                    <a:lnTo>
+                      <a:pt x="11278" y="9802"/>
+                    </a:lnTo>
+                    <a:cubicBezTo>
+                      <a:pt x="12025" y="8751"/>
+                      <a:pt x="12425" y="7498"/>
+                      <a:pt x="12422" y="6212"/>
+                    </a:cubicBezTo>
+                    <a:cubicBezTo>
+                      <a:pt x="12422" y="2786"/>
+                      <a:pt x="9637" y="0"/>
+                      <a:pt x="6213" y="0"/>
+                    </a:cubicBezTo>
+                    <a:close/>
+                  </a:path>
+                </a:pathLst>
+              </a:custGeom>
+              <a:solidFill>
+                <a:srgbClr val="A9ABAA"/>
+              </a:solidFill>
+              <a:ln>
+                <a:noFill/>
+              </a:ln>
+            </p:spPr>
+            <p:txBody>
+              <a:bodyPr spcFirstLastPara="1" wrap="square" lIns="91425" tIns="91425" rIns="91425" bIns="91425" anchor="ctr" anchorCtr="0">
+                <a:noAutofit/>
+              </a:bodyPr>
+              <a:lstStyle/>
+              <a:p>
+                <a:pPr marL="0" lvl="0" indent="0" algn="ctr" rtl="0">
+                  <a:spcBef>
+                    <a:spcPts val="0"/>
+                  </a:spcBef>
+                  <a:spcAft>
+                    <a:spcPts val="0"/>
+                  </a:spcAft>
+                  <a:buNone/>
+                </a:pPr>
+                <a:endParaRPr sz="1400">
+                  <a:solidFill>
+                    <a:srgbClr val="435D74"/>
+                  </a:solidFill>
+                </a:endParaRPr>
+              </a:p>
+            </p:txBody>
+          </p:sp>
+          <p:sp>
+            <p:nvSpPr>
+              <p:cNvPr id="294" name="CasellaDiTesto 293">
+                <a:extLst>
+                  <a:ext uri="{FF2B5EF4-FFF2-40B4-BE49-F238E27FC236}">
+                    <a16:creationId xmlns:a16="http://schemas.microsoft.com/office/drawing/2014/main" id="{627E4D31-F3B6-4071-B6EC-C3A8C3F3CE6B}"/>
+                  </a:ext>
+                </a:extLst>
+              </p:cNvPr>
+              <p:cNvSpPr txBox="1"/>
+              <p:nvPr/>
+            </p:nvSpPr>
+            <p:spPr>
+              <a:xfrm>
+                <a:off x="2890832" y="8802840"/>
+                <a:ext cx="1200312" cy="200055"/>
+              </a:xfrm>
+              <a:prstGeom prst="rect">
+                <a:avLst/>
+              </a:prstGeom>
+              <a:noFill/>
+            </p:spPr>
+            <p:txBody>
+              <a:bodyPr wrap="square" rtlCol="0">
+                <a:spAutoFit/>
+              </a:bodyPr>
+              <a:lstStyle/>
+              <a:p>
+                <a:pPr algn="ctr"/>
+                <a:r>
+                  <a:rPr lang="it-IT" sz="700" dirty="0">
+                    <a:solidFill>
+                      <a:srgbClr val="A9ABAA"/>
+                    </a:solidFill>
+                    <a:latin typeface="Montserrat Light" panose="00000400000000000000" pitchFamily="2" charset="0"/>
+                  </a:rPr>
+                  <a:t>Uniba - Economia</a:t>
+                </a:r>
+              </a:p>
+            </p:txBody>
+          </p:sp>
+        </p:grpSp>
+        <p:grpSp>
+          <p:nvGrpSpPr>
+            <p:cNvPr id="221" name="Gruppo 220">
+              <a:extLst>
+                <a:ext uri="{FF2B5EF4-FFF2-40B4-BE49-F238E27FC236}">
+                  <a16:creationId xmlns:a16="http://schemas.microsoft.com/office/drawing/2014/main" id="{0C9616E1-31B7-4193-9A40-76B721E33CC7}"/>
+                </a:ext>
+              </a:extLst>
+            </p:cNvPr>
+            <p:cNvGrpSpPr/>
+            <p:nvPr/>
+          </p:nvGrpSpPr>
+          <p:grpSpPr>
+            <a:xfrm>
+              <a:off x="5422292" y="8107477"/>
+              <a:ext cx="1454313" cy="930164"/>
+              <a:chOff x="2756060" y="8072731"/>
+              <a:chExt cx="1454313" cy="930164"/>
+            </a:xfrm>
+          </p:grpSpPr>
+          <p:sp>
+            <p:nvSpPr>
+              <p:cNvPr id="234" name="Ovale 233">
+                <a:extLst>
+                  <a:ext uri="{FF2B5EF4-FFF2-40B4-BE49-F238E27FC236}">
+                    <a16:creationId xmlns:a16="http://schemas.microsoft.com/office/drawing/2014/main" id="{8EAFEBBA-75C1-4364-8C8C-3E1119CF76D3}"/>
+                  </a:ext>
+                </a:extLst>
+              </p:cNvPr>
+              <p:cNvSpPr/>
+              <p:nvPr/>
+            </p:nvSpPr>
+            <p:spPr>
+              <a:xfrm>
+                <a:off x="3442015" y="8072731"/>
+                <a:ext cx="82402" cy="82402"/>
+              </a:xfrm>
+              <a:prstGeom prst="ellipse">
+                <a:avLst/>
+              </a:prstGeom>
+              <a:solidFill>
+                <a:srgbClr val="862121"/>
+              </a:solidFill>
+              <a:ln>
+                <a:noFill/>
+              </a:ln>
+            </p:spPr>
+            <p:style>
+              <a:lnRef idx="2">
+                <a:schemeClr val="accent1">
+                  <a:shade val="50000"/>
+                </a:schemeClr>
+              </a:lnRef>
+              <a:fillRef idx="1">
+                <a:schemeClr val="accent1"/>
+              </a:fillRef>
+              <a:effectRef idx="0">
+                <a:schemeClr val="accent1"/>
+              </a:effectRef>
+              <a:fontRef idx="minor">
+                <a:schemeClr val="lt1"/>
+              </a:fontRef>
+            </p:style>
+            <p:txBody>
+              <a:bodyPr rtlCol="0" anchor="ctr"/>
+              <a:lstStyle/>
+              <a:p>
+                <a:pPr algn="ctr"/>
+                <a:endParaRPr lang="it-IT"/>
+              </a:p>
+            </p:txBody>
+          </p:sp>
+          <p:sp>
+            <p:nvSpPr>
+              <p:cNvPr id="238" name="CasellaDiTesto 237">
+                <a:extLst>
+                  <a:ext uri="{FF2B5EF4-FFF2-40B4-BE49-F238E27FC236}">
+                    <a16:creationId xmlns:a16="http://schemas.microsoft.com/office/drawing/2014/main" id="{847A49C5-39B9-4C6F-A8E3-3B3D944254B7}"/>
+                  </a:ext>
+                </a:extLst>
+              </p:cNvPr>
+              <p:cNvSpPr txBox="1"/>
+              <p:nvPr/>
+            </p:nvSpPr>
+            <p:spPr>
+              <a:xfrm>
+                <a:off x="3141980" y="8446679"/>
+                <a:ext cx="682473" cy="200055"/>
+              </a:xfrm>
+              <a:prstGeom prst="rect">
+                <a:avLst/>
+              </a:prstGeom>
+              <a:noFill/>
+            </p:spPr>
+            <p:txBody>
+              <a:bodyPr wrap="square" rtlCol="0">
+                <a:spAutoFit/>
+              </a:bodyPr>
+              <a:lstStyle/>
+              <a:p>
+                <a:pPr algn="ctr"/>
+                <a:r>
+                  <a:rPr lang="it-IT" sz="700" dirty="0">
+                    <a:latin typeface="Montserrat Light" panose="00000400000000000000" pitchFamily="2" charset="0"/>
+                  </a:rPr>
+                  <a:t>2006 - 2011</a:t>
+                </a:r>
+              </a:p>
+            </p:txBody>
+          </p:sp>
+          <p:sp>
+            <p:nvSpPr>
+              <p:cNvPr id="239" name="CasellaDiTesto 238">
+                <a:extLst>
+                  <a:ext uri="{FF2B5EF4-FFF2-40B4-BE49-F238E27FC236}">
+                    <a16:creationId xmlns:a16="http://schemas.microsoft.com/office/drawing/2014/main" id="{D1929A3C-4459-43B1-B14A-81B78659A667}"/>
+                  </a:ext>
+                </a:extLst>
+              </p:cNvPr>
+              <p:cNvSpPr txBox="1"/>
+              <p:nvPr/>
+            </p:nvSpPr>
+            <p:spPr>
+              <a:xfrm>
+                <a:off x="2756060" y="8156915"/>
+                <a:ext cx="1454313" cy="230832"/>
+              </a:xfrm>
+              <a:prstGeom prst="rect">
+                <a:avLst/>
+              </a:prstGeom>
+              <a:noFill/>
+            </p:spPr>
+            <p:txBody>
+              <a:bodyPr wrap="square" rtlCol="0">
+                <a:spAutoFit/>
+              </a:bodyPr>
+              <a:lstStyle/>
+              <a:p>
+                <a:pPr algn="ctr"/>
+                <a:r>
+                  <a:rPr lang="en-US" sz="900" dirty="0" err="1">
+                    <a:solidFill>
+                      <a:srgbClr val="5A5A5A"/>
+                    </a:solidFill>
+                    <a:latin typeface="Montserrat SemiBold" panose="00000700000000000000" pitchFamily="2" charset="0"/>
+                  </a:rPr>
+                  <a:t>Liceo</a:t>
+                </a:r>
+                <a:r>
+                  <a:rPr lang="en-US" sz="900" dirty="0">
+                    <a:solidFill>
+                      <a:srgbClr val="5A5A5A"/>
+                    </a:solidFill>
+                    <a:latin typeface="Montserrat SemiBold" panose="00000700000000000000" pitchFamily="2" charset="0"/>
+                  </a:rPr>
+                  <a:t> </a:t>
+                </a:r>
+                <a:r>
+                  <a:rPr lang="en-US" sz="900" dirty="0" err="1">
+                    <a:solidFill>
+                      <a:srgbClr val="5A5A5A"/>
+                    </a:solidFill>
+                    <a:latin typeface="Montserrat SemiBold" panose="00000700000000000000" pitchFamily="2" charset="0"/>
+                  </a:rPr>
+                  <a:t>Scientifico</a:t>
+                </a:r>
+                <a:endParaRPr lang="en-US" sz="900" dirty="0">
+                  <a:solidFill>
+                    <a:srgbClr val="5A5A5A"/>
+                  </a:solidFill>
+                  <a:latin typeface="Montserrat SemiBold" panose="00000700000000000000" pitchFamily="2" charset="0"/>
+                </a:endParaRPr>
+              </a:p>
+            </p:txBody>
+          </p:sp>
+          <p:sp>
+            <p:nvSpPr>
+              <p:cNvPr id="241" name="Google Shape;4016;p36">
+                <a:extLst>
+                  <a:ext uri="{FF2B5EF4-FFF2-40B4-BE49-F238E27FC236}">
+                    <a16:creationId xmlns:a16="http://schemas.microsoft.com/office/drawing/2014/main" id="{13664964-E393-4884-82F6-092872ABD22E}"/>
+                  </a:ext>
+                </a:extLst>
+              </p:cNvPr>
+              <p:cNvSpPr/>
+              <p:nvPr/>
+            </p:nvSpPr>
+            <p:spPr>
+              <a:xfrm>
+                <a:off x="3446034" y="8693289"/>
+                <a:ext cx="74364" cy="103066"/>
+              </a:xfrm>
+              <a:custGeom>
+                <a:avLst/>
+                <a:gdLst/>
+                <a:ahLst/>
+                <a:cxnLst/>
+                <a:rect l="l" t="t" r="r" b="b"/>
+                <a:pathLst>
+                  <a:path w="12426" h="17222" extrusionOk="0">
+                    <a:moveTo>
+                      <a:pt x="6213" y="3388"/>
+                    </a:moveTo>
+                    <a:cubicBezTo>
+                      <a:pt x="7354" y="3388"/>
+                      <a:pt x="8384" y="4074"/>
+                      <a:pt x="8821" y="5131"/>
+                    </a:cubicBezTo>
+                    <a:cubicBezTo>
+                      <a:pt x="9257" y="6185"/>
+                      <a:pt x="9016" y="7399"/>
+                      <a:pt x="8206" y="8206"/>
+                    </a:cubicBezTo>
+                    <a:cubicBezTo>
+                      <a:pt x="7666" y="8748"/>
+                      <a:pt x="6945" y="9035"/>
+                      <a:pt x="6210" y="9035"/>
+                    </a:cubicBezTo>
+                    <a:cubicBezTo>
+                      <a:pt x="5847" y="9035"/>
+                      <a:pt x="5481" y="8965"/>
+                      <a:pt x="5132" y="8820"/>
+                    </a:cubicBezTo>
+                    <a:cubicBezTo>
+                      <a:pt x="4075" y="8383"/>
+                      <a:pt x="3388" y="7354"/>
+                      <a:pt x="3388" y="6212"/>
+                    </a:cubicBezTo>
+                    <a:cubicBezTo>
+                      <a:pt x="3391" y="4652"/>
+                      <a:pt x="4653" y="3391"/>
+                      <a:pt x="6213" y="3388"/>
+                    </a:cubicBezTo>
+                    <a:close/>
+                    <a:moveTo>
+                      <a:pt x="6213" y="0"/>
+                    </a:moveTo>
+                    <a:cubicBezTo>
+                      <a:pt x="2825" y="0"/>
+                      <a:pt x="1" y="2728"/>
+                      <a:pt x="1" y="6212"/>
+                    </a:cubicBezTo>
+                    <a:cubicBezTo>
+                      <a:pt x="1" y="7537"/>
+                      <a:pt x="398" y="8718"/>
+                      <a:pt x="1163" y="9826"/>
+                    </a:cubicBezTo>
+                    <a:lnTo>
+                      <a:pt x="5737" y="16959"/>
+                    </a:lnTo>
+                    <a:cubicBezTo>
+                      <a:pt x="5847" y="17134"/>
+                      <a:pt x="6029" y="17221"/>
+                      <a:pt x="6211" y="17221"/>
+                    </a:cubicBezTo>
+                    <a:cubicBezTo>
+                      <a:pt x="6394" y="17221"/>
+                      <a:pt x="6576" y="17134"/>
+                      <a:pt x="6686" y="16959"/>
+                    </a:cubicBezTo>
+                    <a:lnTo>
+                      <a:pt x="11278" y="9802"/>
+                    </a:lnTo>
+                    <a:cubicBezTo>
+                      <a:pt x="12025" y="8751"/>
+                      <a:pt x="12425" y="7498"/>
+                      <a:pt x="12422" y="6212"/>
+                    </a:cubicBezTo>
+                    <a:cubicBezTo>
+                      <a:pt x="12422" y="2786"/>
+                      <a:pt x="9637" y="0"/>
+                      <a:pt x="6213" y="0"/>
+                    </a:cubicBezTo>
+                    <a:close/>
+                  </a:path>
+                </a:pathLst>
+              </a:custGeom>
+              <a:solidFill>
+                <a:srgbClr val="A9ABAA"/>
+              </a:solidFill>
+              <a:ln>
+                <a:noFill/>
+              </a:ln>
+            </p:spPr>
+            <p:txBody>
+              <a:bodyPr spcFirstLastPara="1" wrap="square" lIns="91425" tIns="91425" rIns="91425" bIns="91425" anchor="ctr" anchorCtr="0">
+                <a:noAutofit/>
+              </a:bodyPr>
+              <a:lstStyle/>
+              <a:p>
+                <a:pPr marL="0" lvl="0" indent="0" algn="ctr" rtl="0">
+                  <a:spcBef>
+                    <a:spcPts val="0"/>
+                  </a:spcBef>
+                  <a:spcAft>
+                    <a:spcPts val="0"/>
+                  </a:spcAft>
+                  <a:buNone/>
+                </a:pPr>
+                <a:endParaRPr sz="1400">
+                  <a:solidFill>
+                    <a:srgbClr val="435D74"/>
+                  </a:solidFill>
+                </a:endParaRPr>
+              </a:p>
+            </p:txBody>
+          </p:sp>
+          <p:sp>
+            <p:nvSpPr>
+              <p:cNvPr id="287" name="CasellaDiTesto 286">
+                <a:extLst>
+                  <a:ext uri="{FF2B5EF4-FFF2-40B4-BE49-F238E27FC236}">
+                    <a16:creationId xmlns:a16="http://schemas.microsoft.com/office/drawing/2014/main" id="{256A9A3D-A76F-46E7-A4C5-E370183A09BB}"/>
+                  </a:ext>
+                </a:extLst>
+              </p:cNvPr>
+              <p:cNvSpPr txBox="1"/>
+              <p:nvPr/>
+            </p:nvSpPr>
+            <p:spPr>
+              <a:xfrm>
+                <a:off x="2789665" y="8802840"/>
+                <a:ext cx="1385276" cy="200055"/>
+              </a:xfrm>
+              <a:prstGeom prst="rect">
+                <a:avLst/>
+              </a:prstGeom>
+              <a:noFill/>
+            </p:spPr>
+            <p:txBody>
+              <a:bodyPr wrap="square" rtlCol="0">
+                <a:spAutoFit/>
+              </a:bodyPr>
+              <a:lstStyle/>
+              <a:p>
+                <a:pPr algn="ctr"/>
+                <a:r>
+                  <a:rPr lang="it-IT" sz="700" dirty="0">
+                    <a:solidFill>
+                      <a:srgbClr val="A9ABAA"/>
+                    </a:solidFill>
+                    <a:latin typeface="Montserrat Light" panose="00000400000000000000" pitchFamily="2" charset="0"/>
+                  </a:rPr>
+                  <a:t>Liceo – E. Fermi </a:t>
+                </a:r>
+              </a:p>
+            </p:txBody>
+          </p:sp>
+        </p:grpSp>
+        <p:cxnSp>
+          <p:nvCxnSpPr>
+            <p:cNvPr id="222" name="Connettore diritto 221">
+              <a:extLst>
+                <a:ext uri="{FF2B5EF4-FFF2-40B4-BE49-F238E27FC236}">
+                  <a16:creationId xmlns:a16="http://schemas.microsoft.com/office/drawing/2014/main" id="{4E8A342A-5F76-418B-A535-F0E3A53F6FB3}"/>
+                </a:ext>
+              </a:extLst>
+            </p:cNvPr>
+            <p:cNvCxnSpPr>
+              <a:cxnSpLocks/>
+              <a:stCxn id="234" idx="2"/>
+              <a:endCxn id="288" idx="6"/>
+            </p:cNvCxnSpPr>
+            <p:nvPr/>
+          </p:nvCxnSpPr>
+          <p:spPr>
+            <a:xfrm flipH="1">
+              <a:off x="3309937" y="8148678"/>
+              <a:ext cx="2798310" cy="0"/>
+            </a:xfrm>
+            <a:prstGeom prst="line">
+              <a:avLst/>
+            </a:prstGeom>
+            <a:ln w="9525">
+              <a:solidFill>
+                <a:srgbClr val="C9C9C9"/>
+              </a:solidFill>
+              <a:prstDash val="sysDot"/>
+            </a:ln>
+          </p:spPr>
+          <p:style>
+            <a:lnRef idx="1">
+              <a:schemeClr val="accent1"/>
+            </a:lnRef>
+            <a:fillRef idx="0">
+              <a:schemeClr val="accent1"/>
+            </a:fillRef>
+            <a:effectRef idx="0">
+              <a:schemeClr val="accent1"/>
+            </a:effectRef>
+            <a:fontRef idx="minor">
+              <a:schemeClr val="tx1"/>
+            </a:fontRef>
+          </p:style>
+        </p:cxnSp>
+        <p:grpSp>
+          <p:nvGrpSpPr>
+            <p:cNvPr id="224" name="Gruppo 223">
+              <a:extLst>
+                <a:ext uri="{FF2B5EF4-FFF2-40B4-BE49-F238E27FC236}">
+                  <a16:creationId xmlns:a16="http://schemas.microsoft.com/office/drawing/2014/main" id="{21AE4A80-CD51-4170-A602-8157FA35F88E}"/>
+                </a:ext>
+              </a:extLst>
+            </p:cNvPr>
+            <p:cNvGrpSpPr/>
+            <p:nvPr/>
+          </p:nvGrpSpPr>
+          <p:grpSpPr>
+            <a:xfrm>
+              <a:off x="3836999" y="8107477"/>
+              <a:ext cx="1759730" cy="930164"/>
+              <a:chOff x="2611123" y="8072731"/>
+              <a:chExt cx="1759730" cy="930164"/>
+            </a:xfrm>
+          </p:grpSpPr>
+          <p:sp>
+            <p:nvSpPr>
+              <p:cNvPr id="226" name="CasellaDiTesto 225">
+                <a:extLst>
+                  <a:ext uri="{FF2B5EF4-FFF2-40B4-BE49-F238E27FC236}">
+                    <a16:creationId xmlns:a16="http://schemas.microsoft.com/office/drawing/2014/main" id="{6BFC757E-F10A-41A0-BC28-872811433D49}"/>
+                  </a:ext>
+                </a:extLst>
+              </p:cNvPr>
+              <p:cNvSpPr txBox="1"/>
+              <p:nvPr/>
+            </p:nvSpPr>
+            <p:spPr>
+              <a:xfrm>
+                <a:off x="3141980" y="8446679"/>
+                <a:ext cx="682473" cy="200055"/>
+              </a:xfrm>
+              <a:prstGeom prst="rect">
+                <a:avLst/>
+              </a:prstGeom>
+              <a:noFill/>
+            </p:spPr>
+            <p:txBody>
+              <a:bodyPr wrap="square" rtlCol="0">
+                <a:spAutoFit/>
+              </a:bodyPr>
+              <a:lstStyle/>
+              <a:p>
+                <a:pPr algn="ctr"/>
+                <a:r>
+                  <a:rPr lang="it-IT" sz="700" dirty="0">
+                    <a:latin typeface="Montserrat Light" panose="00000400000000000000" pitchFamily="2" charset="0"/>
+                  </a:rPr>
+                  <a:t>2011 - 2014</a:t>
+                </a:r>
+              </a:p>
+            </p:txBody>
+          </p:sp>
+          <p:sp>
+            <p:nvSpPr>
+              <p:cNvPr id="228" name="CasellaDiTesto 227">
+                <a:extLst>
+                  <a:ext uri="{FF2B5EF4-FFF2-40B4-BE49-F238E27FC236}">
+                    <a16:creationId xmlns:a16="http://schemas.microsoft.com/office/drawing/2014/main" id="{F748698D-36BF-4C7F-BB4D-844D91AC88B7}"/>
+                  </a:ext>
+                </a:extLst>
+              </p:cNvPr>
+              <p:cNvSpPr txBox="1"/>
+              <p:nvPr/>
+            </p:nvSpPr>
+            <p:spPr>
+              <a:xfrm>
+                <a:off x="2611123" y="8163595"/>
+                <a:ext cx="1759730" cy="369332"/>
+              </a:xfrm>
+              <a:prstGeom prst="rect">
+                <a:avLst/>
+              </a:prstGeom>
+              <a:noFill/>
+            </p:spPr>
+            <p:txBody>
+              <a:bodyPr wrap="square" rtlCol="0">
+                <a:spAutoFit/>
+              </a:bodyPr>
+              <a:lstStyle/>
+              <a:p>
+                <a:pPr algn="ctr"/>
+                <a:r>
+                  <a:rPr lang="en-US" sz="900" dirty="0">
+                    <a:solidFill>
+                      <a:srgbClr val="5A5A5A"/>
+                    </a:solidFill>
+                    <a:latin typeface="Montserrat SemiBold" panose="00000700000000000000" pitchFamily="2" charset="0"/>
+                  </a:rPr>
+                  <a:t>Laurea in Marketing &amp; Comunicazione d’azienda</a:t>
+                </a:r>
+              </a:p>
+            </p:txBody>
+          </p:sp>
+          <p:sp>
+            <p:nvSpPr>
+              <p:cNvPr id="229" name="Google Shape;4016;p36">
+                <a:extLst>
+                  <a:ext uri="{FF2B5EF4-FFF2-40B4-BE49-F238E27FC236}">
+                    <a16:creationId xmlns:a16="http://schemas.microsoft.com/office/drawing/2014/main" id="{FA896C9A-6D08-4DBB-96EF-A73EA832A02A}"/>
+                  </a:ext>
+                </a:extLst>
+              </p:cNvPr>
+              <p:cNvSpPr/>
+              <p:nvPr/>
+            </p:nvSpPr>
+            <p:spPr>
+              <a:xfrm>
+                <a:off x="3446034" y="8693289"/>
+                <a:ext cx="74364" cy="103066"/>
+              </a:xfrm>
+              <a:custGeom>
+                <a:avLst/>
+                <a:gdLst/>
+                <a:ahLst/>
+                <a:cxnLst/>
+                <a:rect l="l" t="t" r="r" b="b"/>
+                <a:pathLst>
+                  <a:path w="12426" h="17222" extrusionOk="0">
+                    <a:moveTo>
+                      <a:pt x="6213" y="3388"/>
+                    </a:moveTo>
+                    <a:cubicBezTo>
+                      <a:pt x="7354" y="3388"/>
+                      <a:pt x="8384" y="4074"/>
+                      <a:pt x="8821" y="5131"/>
+                    </a:cubicBezTo>
+                    <a:cubicBezTo>
+                      <a:pt x="9257" y="6185"/>
+                      <a:pt x="9016" y="7399"/>
+                      <a:pt x="8206" y="8206"/>
+                    </a:cubicBezTo>
+                    <a:cubicBezTo>
+                      <a:pt x="7666" y="8748"/>
+                      <a:pt x="6945" y="9035"/>
+                      <a:pt x="6210" y="9035"/>
+                    </a:cubicBezTo>
+                    <a:cubicBezTo>
+                      <a:pt x="5847" y="9035"/>
+                      <a:pt x="5481" y="8965"/>
+                      <a:pt x="5132" y="8820"/>
+                    </a:cubicBezTo>
+                    <a:cubicBezTo>
+                      <a:pt x="4075" y="8383"/>
+                      <a:pt x="3388" y="7354"/>
+                      <a:pt x="3388" y="6212"/>
+                    </a:cubicBezTo>
+                    <a:cubicBezTo>
+                      <a:pt x="3391" y="4652"/>
+                      <a:pt x="4653" y="3391"/>
+                      <a:pt x="6213" y="3388"/>
+                    </a:cubicBezTo>
+                    <a:close/>
+                    <a:moveTo>
+                      <a:pt x="6213" y="0"/>
+                    </a:moveTo>
+                    <a:cubicBezTo>
+                      <a:pt x="2825" y="0"/>
+                      <a:pt x="1" y="2728"/>
+                      <a:pt x="1" y="6212"/>
+                    </a:cubicBezTo>
+                    <a:cubicBezTo>
+                      <a:pt x="1" y="7537"/>
+                      <a:pt x="398" y="8718"/>
+                      <a:pt x="1163" y="9826"/>
+                    </a:cubicBezTo>
+                    <a:lnTo>
+                      <a:pt x="5737" y="16959"/>
+                    </a:lnTo>
+                    <a:cubicBezTo>
+                      <a:pt x="5847" y="17134"/>
+                      <a:pt x="6029" y="17221"/>
+                      <a:pt x="6211" y="17221"/>
+                    </a:cubicBezTo>
+                    <a:cubicBezTo>
+                      <a:pt x="6394" y="17221"/>
+                      <a:pt x="6576" y="17134"/>
+                      <a:pt x="6686" y="16959"/>
+                    </a:cubicBezTo>
+                    <a:lnTo>
+                      <a:pt x="11278" y="9802"/>
+                    </a:lnTo>
+                    <a:cubicBezTo>
+                      <a:pt x="12025" y="8751"/>
+                      <a:pt x="12425" y="7498"/>
+                      <a:pt x="12422" y="6212"/>
+                    </a:cubicBezTo>
+                    <a:cubicBezTo>
+                      <a:pt x="12422" y="2786"/>
+                      <a:pt x="9637" y="0"/>
+                      <a:pt x="6213" y="0"/>
+                    </a:cubicBezTo>
+                    <a:close/>
+                  </a:path>
+                </a:pathLst>
+              </a:custGeom>
+              <a:solidFill>
+                <a:srgbClr val="A9ABAA"/>
+              </a:solidFill>
+              <a:ln>
+                <a:noFill/>
+              </a:ln>
+            </p:spPr>
+            <p:txBody>
+              <a:bodyPr spcFirstLastPara="1" wrap="square" lIns="91425" tIns="91425" rIns="91425" bIns="91425" anchor="ctr" anchorCtr="0">
+                <a:noAutofit/>
+              </a:bodyPr>
+              <a:lstStyle/>
+              <a:p>
+                <a:pPr marL="0" lvl="0" indent="0" algn="ctr" rtl="0">
+                  <a:spcBef>
+                    <a:spcPts val="0"/>
+                  </a:spcBef>
+                  <a:spcAft>
+                    <a:spcPts val="0"/>
+                  </a:spcAft>
+                  <a:buNone/>
+                </a:pPr>
+                <a:endParaRPr sz="1400">
+                  <a:solidFill>
+                    <a:srgbClr val="435D74"/>
+                  </a:solidFill>
+                </a:endParaRPr>
+              </a:p>
+            </p:txBody>
+          </p:sp>
+          <p:sp>
+            <p:nvSpPr>
+              <p:cNvPr id="231" name="CasellaDiTesto 230">
+                <a:extLst>
+                  <a:ext uri="{FF2B5EF4-FFF2-40B4-BE49-F238E27FC236}">
+                    <a16:creationId xmlns:a16="http://schemas.microsoft.com/office/drawing/2014/main" id="{91C629AF-CB41-4B08-A50D-9B275F043E70}"/>
+                  </a:ext>
+                </a:extLst>
+              </p:cNvPr>
+              <p:cNvSpPr txBox="1"/>
+              <p:nvPr/>
+            </p:nvSpPr>
+            <p:spPr>
+              <a:xfrm>
+                <a:off x="2890818" y="8802840"/>
+                <a:ext cx="1200312" cy="200055"/>
+              </a:xfrm>
+              <a:prstGeom prst="rect">
+                <a:avLst/>
+              </a:prstGeom>
+              <a:noFill/>
+            </p:spPr>
+            <p:txBody>
+              <a:bodyPr wrap="square" rtlCol="0">
+                <a:spAutoFit/>
+              </a:bodyPr>
+              <a:lstStyle/>
+              <a:p>
+                <a:pPr algn="ctr"/>
+                <a:r>
+                  <a:rPr lang="it-IT" sz="700" dirty="0">
+                    <a:solidFill>
+                      <a:srgbClr val="A9ABAA"/>
+                    </a:solidFill>
+                    <a:latin typeface="Montserrat Light" panose="00000400000000000000" pitchFamily="2" charset="0"/>
+                  </a:rPr>
+                  <a:t>Uniba - Economia</a:t>
+                </a:r>
+              </a:p>
+            </p:txBody>
+          </p:sp>
+          <p:sp>
+            <p:nvSpPr>
+              <p:cNvPr id="233" name="Ovale 232">
+                <a:extLst>
+                  <a:ext uri="{FF2B5EF4-FFF2-40B4-BE49-F238E27FC236}">
+                    <a16:creationId xmlns:a16="http://schemas.microsoft.com/office/drawing/2014/main" id="{850130DF-56E1-499A-86C2-5047B343042F}"/>
+                  </a:ext>
+                </a:extLst>
+              </p:cNvPr>
+              <p:cNvSpPr/>
+              <p:nvPr/>
+            </p:nvSpPr>
+            <p:spPr>
+              <a:xfrm>
+                <a:off x="3442015" y="8072731"/>
+                <a:ext cx="82402" cy="82402"/>
+              </a:xfrm>
+              <a:prstGeom prst="ellipse">
+                <a:avLst/>
+              </a:prstGeom>
+              <a:solidFill>
+                <a:srgbClr val="862121"/>
+              </a:solidFill>
+              <a:ln>
+                <a:noFill/>
+              </a:ln>
+            </p:spPr>
+            <p:style>
+              <a:lnRef idx="2">
+                <a:schemeClr val="accent1">
+                  <a:shade val="50000"/>
+                </a:schemeClr>
+              </a:lnRef>
+              <a:fillRef idx="1">
+                <a:schemeClr val="accent1"/>
+              </a:fillRef>
+              <a:effectRef idx="0">
+                <a:schemeClr val="accent1"/>
+              </a:effectRef>
+              <a:fontRef idx="minor">
+                <a:schemeClr val="lt1"/>
+              </a:fontRef>
+            </p:style>
+            <p:txBody>
+              <a:bodyPr rtlCol="0" anchor="ctr"/>
+              <a:lstStyle/>
+              <a:p>
+                <a:pPr algn="ctr"/>
+                <a:endParaRPr lang="it-IT"/>
+              </a:p>
+            </p:txBody>
+          </p:sp>
+        </p:grpSp>
+        <p:cxnSp>
+          <p:nvCxnSpPr>
+            <p:cNvPr id="225" name="Connettore diritto 224">
+              <a:extLst>
+                <a:ext uri="{FF2B5EF4-FFF2-40B4-BE49-F238E27FC236}">
+                  <a16:creationId xmlns:a16="http://schemas.microsoft.com/office/drawing/2014/main" id="{4EC365A7-9DB9-46FB-8972-38E47080B016}"/>
+                </a:ext>
+              </a:extLst>
+            </p:cNvPr>
+            <p:cNvCxnSpPr>
+              <a:cxnSpLocks/>
+            </p:cNvCxnSpPr>
+            <p:nvPr/>
+          </p:nvCxnSpPr>
+          <p:spPr>
+            <a:xfrm>
+              <a:off x="2852738" y="9161446"/>
+              <a:ext cx="3756580" cy="0"/>
+            </a:xfrm>
+            <a:prstGeom prst="line">
+              <a:avLst/>
+            </a:prstGeom>
+            <a:ln w="25400">
+              <a:solidFill>
+                <a:srgbClr val="A9ABAA"/>
+              </a:solidFill>
+            </a:ln>
+          </p:spPr>
+          <p:style>
+            <a:lnRef idx="1">
+              <a:schemeClr val="accent1"/>
+            </a:lnRef>
+            <a:fillRef idx="0">
+              <a:schemeClr val="accent1"/>
+            </a:fillRef>
+            <a:effectRef idx="0">
+              <a:schemeClr val="accent1"/>
+            </a:effectRef>
+            <a:fontRef idx="minor">
+              <a:schemeClr val="tx1"/>
+            </a:fontRef>
+          </p:style>
+        </p:cxnSp>
+      </p:grpSp>
+      <p:sp>
+        <p:nvSpPr>
+          <p:cNvPr id="5" name="Ovale 4">
             <a:extLst>
-              <a:ext uri="{28A0092B-C50C-407E-A947-70E740481C1C}">
-                <a14:useLocalDpi xmlns:a14="http://schemas.microsoft.com/office/drawing/2010/main" val="0"/>
+              <a:ext uri="{FF2B5EF4-FFF2-40B4-BE49-F238E27FC236}">
+                <a16:creationId xmlns:a16="http://schemas.microsoft.com/office/drawing/2014/main" id="{B710C558-7CBA-447D-AF27-8ED9FF3D33BB}"/>
               </a:ext>
             </a:extLst>
-          </a:blip>
-          <a:srcRect l="704" t="695" r="6734" b="37595"/>
-          <a:stretch/>
-        </p:blipFill>
+          </p:cNvPr>
+          <p:cNvSpPr/>
+          <p:nvPr/>
+        </p:nvSpPr>
         <p:spPr>
           <a:xfrm>
-            <a:off x="504000" y="342000"/>
-            <a:ext cx="1573202" cy="1573200"/>
+            <a:off x="2885965" y="3454924"/>
+            <a:ext cx="82402" cy="82402"/>
+          </a:xfrm>
+          <a:prstGeom prst="ellipse">
+            <a:avLst/>
+          </a:prstGeom>
+          <a:solidFill>
+            <a:srgbClr val="862121"/>
+          </a:solidFill>
+          <a:ln>
+            <a:noFill/>
+          </a:ln>
+        </p:spPr>
+        <p:style>
+          <a:lnRef idx="2">
+            <a:schemeClr val="accent1">
+              <a:shade val="50000"/>
+            </a:schemeClr>
+          </a:lnRef>
+          <a:fillRef idx="1">
+            <a:schemeClr val="accent1"/>
+          </a:fillRef>
+          <a:effectRef idx="0">
+            <a:schemeClr val="accent1"/>
+          </a:effectRef>
+          <a:fontRef idx="minor">
+            <a:schemeClr val="lt1"/>
+          </a:fontRef>
+        </p:style>
+        <p:txBody>
+          <a:bodyPr rtlCol="0" anchor="ctr"/>
+          <a:lstStyle/>
+          <a:p>
+            <a:pPr algn="ctr"/>
+            <a:endParaRPr lang="it-IT" dirty="0"/>
+          </a:p>
+        </p:txBody>
+      </p:sp>
+      <p:sp>
+        <p:nvSpPr>
+          <p:cNvPr id="295" name="CasellaDiTesto 294">
+            <a:extLst>
+              <a:ext uri="{FF2B5EF4-FFF2-40B4-BE49-F238E27FC236}">
+                <a16:creationId xmlns:a16="http://schemas.microsoft.com/office/drawing/2014/main" id="{FB4E167D-FB0D-4F85-BDF5-72B4AD368139}"/>
+              </a:ext>
+            </a:extLst>
+          </p:cNvPr>
+          <p:cNvSpPr txBox="1"/>
+          <p:nvPr/>
+        </p:nvSpPr>
+        <p:spPr>
+          <a:xfrm>
+            <a:off x="2927501" y="2235620"/>
+            <a:ext cx="726970" cy="200055"/>
+          </a:xfrm>
+          <a:prstGeom prst="rect">
+            <a:avLst/>
+          </a:prstGeom>
+          <a:noFill/>
+        </p:spPr>
+        <p:txBody>
+          <a:bodyPr wrap="square" rtlCol="0">
+            <a:spAutoFit/>
+          </a:bodyPr>
+          <a:lstStyle/>
+          <a:p>
+            <a:r>
+              <a:rPr lang="it-IT" sz="700" dirty="0">
+                <a:latin typeface="Montserrat Light" panose="00000400000000000000" pitchFamily="2" charset="0"/>
+              </a:rPr>
+              <a:t>2020 – Att.</a:t>
+            </a:r>
+          </a:p>
+        </p:txBody>
+      </p:sp>
+      <p:sp>
+        <p:nvSpPr>
+          <p:cNvPr id="296" name="CasellaDiTesto 295">
+            <a:extLst>
+              <a:ext uri="{FF2B5EF4-FFF2-40B4-BE49-F238E27FC236}">
+                <a16:creationId xmlns:a16="http://schemas.microsoft.com/office/drawing/2014/main" id="{966F5D60-957F-4CC2-A361-FBC8A571A4B1}"/>
+              </a:ext>
+            </a:extLst>
+          </p:cNvPr>
+          <p:cNvSpPr txBox="1"/>
+          <p:nvPr/>
+        </p:nvSpPr>
+        <p:spPr>
+          <a:xfrm>
+            <a:off x="3593483" y="2220231"/>
+            <a:ext cx="3099417" cy="230832"/>
+          </a:xfrm>
+          <a:prstGeom prst="rect">
+            <a:avLst/>
+          </a:prstGeom>
+          <a:noFill/>
+        </p:spPr>
+        <p:txBody>
+          <a:bodyPr wrap="square" rtlCol="0">
+            <a:spAutoFit/>
+          </a:bodyPr>
+          <a:lstStyle/>
+          <a:p>
+            <a:r>
+              <a:rPr lang="en-US" sz="900" dirty="0" err="1">
+                <a:solidFill>
+                  <a:srgbClr val="5A5A5A"/>
+                </a:solidFill>
+                <a:latin typeface="Montserrat SemiBold" panose="00000700000000000000" pitchFamily="2" charset="0"/>
+              </a:rPr>
+              <a:t>Consulente</a:t>
+            </a:r>
+            <a:r>
+              <a:rPr lang="en-US" sz="900" dirty="0">
+                <a:solidFill>
+                  <a:srgbClr val="5A5A5A"/>
+                </a:solidFill>
+                <a:latin typeface="Montserrat SemiBold" panose="00000700000000000000" pitchFamily="2" charset="0"/>
+              </a:rPr>
+              <a:t> </a:t>
+            </a:r>
+            <a:r>
+              <a:rPr lang="en-US" sz="900" dirty="0" err="1">
+                <a:solidFill>
+                  <a:srgbClr val="5A5A5A"/>
+                </a:solidFill>
+                <a:latin typeface="Montserrat SemiBold" panose="00000700000000000000" pitchFamily="2" charset="0"/>
+              </a:rPr>
+              <a:t>vendite</a:t>
+            </a:r>
+            <a:r>
+              <a:rPr lang="en-US" sz="900" dirty="0">
+                <a:solidFill>
+                  <a:srgbClr val="5A5A5A"/>
+                </a:solidFill>
+                <a:latin typeface="Montserrat SemiBold" panose="00000700000000000000" pitchFamily="2" charset="0"/>
+              </a:rPr>
+              <a:t> automotive</a:t>
+            </a:r>
+          </a:p>
+        </p:txBody>
+      </p:sp>
+      <p:sp>
+        <p:nvSpPr>
+          <p:cNvPr id="301" name="Google Shape;4016;p36">
+            <a:extLst>
+              <a:ext uri="{FF2B5EF4-FFF2-40B4-BE49-F238E27FC236}">
+                <a16:creationId xmlns:a16="http://schemas.microsoft.com/office/drawing/2014/main" id="{77843DDA-A684-4DDC-9778-D7EC0D870CB8}"/>
+              </a:ext>
+            </a:extLst>
+          </p:cNvPr>
+          <p:cNvSpPr/>
+          <p:nvPr/>
+        </p:nvSpPr>
+        <p:spPr>
+          <a:xfrm>
+            <a:off x="3007251" y="2855026"/>
+            <a:ext cx="74364" cy="103066"/>
           </a:xfrm>
           <a:custGeom>
             <a:avLst/>
-            <a:gdLst>
-              <a:gd name="connsiteX0" fmla="*/ 3056452 w 6112904"/>
-              <a:gd name="connsiteY0" fmla="*/ 0 h 6112904"/>
-              <a:gd name="connsiteX1" fmla="*/ 6112904 w 6112904"/>
-              <a:gd name="connsiteY1" fmla="*/ 3056452 h 6112904"/>
-              <a:gd name="connsiteX2" fmla="*/ 3056452 w 6112904"/>
-              <a:gd name="connsiteY2" fmla="*/ 6112904 h 6112904"/>
-              <a:gd name="connsiteX3" fmla="*/ 0 w 6112904"/>
-              <a:gd name="connsiteY3" fmla="*/ 3056452 h 6112904"/>
-              <a:gd name="connsiteX4" fmla="*/ 3056452 w 6112904"/>
-              <a:gd name="connsiteY4" fmla="*/ 0 h 6112904"/>
-            </a:gdLst>
+            <a:gdLst/>
             <a:ahLst/>
-            <a:cxnLst>
-              <a:cxn ang="0">
-                <a:pos x="connsiteX0" y="connsiteY0"/>
-              </a:cxn>
-              <a:cxn ang="0">
-                <a:pos x="connsiteX1" y="connsiteY1"/>
-              </a:cxn>
-              <a:cxn ang="0">
-                <a:pos x="connsiteX2" y="connsiteY2"/>
-              </a:cxn>
-              <a:cxn ang="0">
-                <a:pos x="connsiteX3" y="connsiteY3"/>
-              </a:cxn>
-              <a:cxn ang="0">
-                <a:pos x="connsiteX4" y="connsiteY4"/>
-              </a:cxn>
-            </a:cxnLst>
+            <a:cxnLst/>
             <a:rect l="l" t="t" r="r" b="b"/>
             <a:pathLst>
-              <a:path w="6112904" h="6112904">
+              <a:path w="12426" h="17222" extrusionOk="0">
                 <a:moveTo>
-                  <a:pt x="3056452" y="0"/>
+                  <a:pt x="6213" y="3388"/>
                 </a:moveTo>
                 <a:cubicBezTo>
-                  <a:pt x="4744484" y="0"/>
-                  <a:pt x="6112904" y="1368420"/>
-                  <a:pt x="6112904" y="3056452"/>
-                </a:cubicBezTo>
-                <a:cubicBezTo>
-                  <a:pt x="6112904" y="4744484"/>
-                  <a:pt x="4744484" y="6112904"/>
-                  <a:pt x="3056452" y="6112904"/>
-                </a:cubicBezTo>
-                <a:cubicBezTo>
-                  <a:pt x="1368420" y="6112904"/>
-                  <a:pt x="0" y="4744484"/>
-                  <a:pt x="0" y="3056452"/>
-                </a:cubicBezTo>
-                <a:cubicBezTo>
-                  <a:pt x="0" y="1368420"/>
-                  <a:pt x="1368420" y="0"/>
-                  <a:pt x="3056452" y="0"/>
+                  <a:pt x="7354" y="3388"/>
+                  <a:pt x="8384" y="4074"/>
+                  <a:pt x="8821" y="5131"/>
+                </a:cubicBezTo>
+                <a:cubicBezTo>
+                  <a:pt x="9257" y="6185"/>
+                  <a:pt x="9016" y="7399"/>
+                  <a:pt x="8206" y="8206"/>
+                </a:cubicBezTo>
+                <a:cubicBezTo>
+                  <a:pt x="7666" y="8748"/>
+                  <a:pt x="6945" y="9035"/>
+                  <a:pt x="6210" y="9035"/>
+                </a:cubicBezTo>
+                <a:cubicBezTo>
+                  <a:pt x="5847" y="9035"/>
+                  <a:pt x="5481" y="8965"/>
+                  <a:pt x="5132" y="8820"/>
+                </a:cubicBezTo>
+                <a:cubicBezTo>
+                  <a:pt x="4075" y="8383"/>
+                  <a:pt x="3388" y="7354"/>
+                  <a:pt x="3388" y="6212"/>
+                </a:cubicBezTo>
+                <a:cubicBezTo>
+                  <a:pt x="3391" y="4652"/>
+                  <a:pt x="4653" y="3391"/>
+                  <a:pt x="6213" y="3388"/>
+                </a:cubicBezTo>
+                <a:close/>
+                <a:moveTo>
+                  <a:pt x="6213" y="0"/>
+                </a:moveTo>
+                <a:cubicBezTo>
+                  <a:pt x="2825" y="0"/>
+                  <a:pt x="1" y="2728"/>
+                  <a:pt x="1" y="6212"/>
+                </a:cubicBezTo>
+                <a:cubicBezTo>
+                  <a:pt x="1" y="7537"/>
+                  <a:pt x="398" y="8718"/>
+                  <a:pt x="1163" y="9826"/>
+                </a:cubicBezTo>
+                <a:lnTo>
+                  <a:pt x="5737" y="16959"/>
+                </a:lnTo>
+                <a:cubicBezTo>
+                  <a:pt x="5847" y="17134"/>
+                  <a:pt x="6029" y="17221"/>
+                  <a:pt x="6211" y="17221"/>
+                </a:cubicBezTo>
+                <a:cubicBezTo>
+                  <a:pt x="6394" y="17221"/>
+                  <a:pt x="6576" y="17134"/>
+                  <a:pt x="6686" y="16959"/>
+                </a:cubicBezTo>
+                <a:lnTo>
+                  <a:pt x="11278" y="9802"/>
+                </a:lnTo>
+                <a:cubicBezTo>
+                  <a:pt x="12025" y="8751"/>
+                  <a:pt x="12425" y="7498"/>
+                  <a:pt x="12422" y="6212"/>
+                </a:cubicBezTo>
+                <a:cubicBezTo>
+                  <a:pt x="12422" y="2786"/>
+                  <a:pt x="9637" y="0"/>
+                  <a:pt x="6213" y="0"/>
                 </a:cubicBezTo>
                 <a:close/>
               </a:path>
             </a:pathLst>
           </a:custGeom>
+          <a:solidFill>
+            <a:srgbClr val="A9ABAA"/>
+          </a:solidFill>
+          <a:ln>
+            <a:noFill/>
+          </a:ln>
         </p:spPr>
-      </p:pic>
+        <p:txBody>
+          <a:bodyPr spcFirstLastPara="1" wrap="square" lIns="91425" tIns="91425" rIns="91425" bIns="91425" anchor="ctr" anchorCtr="0">
+            <a:noAutofit/>
+          </a:bodyPr>
+          <a:lstStyle/>
+          <a:p>
+            <a:pPr marL="0" lvl="0" indent="0" algn="l" rtl="0">
+              <a:spcBef>
+                <a:spcPts val="0"/>
+              </a:spcBef>
+              <a:spcAft>
+                <a:spcPts val="0"/>
+              </a:spcAft>
+              <a:buNone/>
+            </a:pPr>
+            <a:endParaRPr sz="1400">
+              <a:solidFill>
+                <a:srgbClr val="435D74"/>
+              </a:solidFill>
+            </a:endParaRPr>
+          </a:p>
+        </p:txBody>
+      </p:sp>
+      <p:sp>
+        <p:nvSpPr>
+          <p:cNvPr id="303" name="CasellaDiTesto 302">
+            <a:extLst>
+              <a:ext uri="{FF2B5EF4-FFF2-40B4-BE49-F238E27FC236}">
+                <a16:creationId xmlns:a16="http://schemas.microsoft.com/office/drawing/2014/main" id="{E9050B64-4F64-4CAE-974B-E9F286D5FE7A}"/>
+              </a:ext>
+            </a:extLst>
+          </p:cNvPr>
+          <p:cNvSpPr txBox="1"/>
+          <p:nvPr/>
+        </p:nvSpPr>
+        <p:spPr>
+          <a:xfrm>
+            <a:off x="3078650" y="2806532"/>
+            <a:ext cx="480995" cy="200055"/>
+          </a:xfrm>
+          <a:prstGeom prst="rect">
+            <a:avLst/>
+          </a:prstGeom>
+          <a:noFill/>
+        </p:spPr>
+        <p:txBody>
+          <a:bodyPr wrap="square" rtlCol="0">
+            <a:spAutoFit/>
+          </a:bodyPr>
+          <a:lstStyle/>
+          <a:p>
+            <a:r>
+              <a:rPr lang="it-IT" sz="700" dirty="0">
+                <a:solidFill>
+                  <a:srgbClr val="A9ABAA"/>
+                </a:solidFill>
+                <a:latin typeface="Montserrat Light" panose="00000400000000000000" pitchFamily="2" charset="0"/>
+              </a:rPr>
+              <a:t>Bari</a:t>
+            </a:r>
+          </a:p>
+        </p:txBody>
+      </p:sp>
+      <p:sp>
+        <p:nvSpPr>
+          <p:cNvPr id="304" name="CasellaDiTesto 303">
+            <a:extLst>
+              <a:ext uri="{FF2B5EF4-FFF2-40B4-BE49-F238E27FC236}">
+                <a16:creationId xmlns:a16="http://schemas.microsoft.com/office/drawing/2014/main" id="{9ACA8AF7-0193-46E1-B895-7D53FE8FEDC2}"/>
+              </a:ext>
+            </a:extLst>
+          </p:cNvPr>
+          <p:cNvSpPr txBox="1"/>
+          <p:nvPr/>
+        </p:nvSpPr>
+        <p:spPr>
+          <a:xfrm>
+            <a:off x="3605355" y="2481504"/>
+            <a:ext cx="2975387" cy="830997"/>
+          </a:xfrm>
+          <a:prstGeom prst="rect">
+            <a:avLst/>
+          </a:prstGeom>
+          <a:noFill/>
+        </p:spPr>
+        <p:txBody>
+          <a:bodyPr wrap="square" rtlCol="0">
+            <a:spAutoFit/>
+          </a:bodyPr>
+          <a:lstStyle/>
+          <a:p>
+            <a:pPr marL="88900" indent="-88900"/>
+            <a:r>
+              <a:rPr lang="it-IT" sz="800" dirty="0">
+                <a:solidFill>
+                  <a:srgbClr val="000000"/>
+                </a:solidFill>
+                <a:latin typeface="Montserrat" panose="00000500000000000000" pitchFamily="2" charset="0"/>
+              </a:rPr>
+              <a:t>▪ Seguire il cliente nell’esperienza di acquisto </a:t>
+            </a:r>
+          </a:p>
+          <a:p>
+            <a:pPr marL="88900" indent="-88900"/>
+            <a:r>
+              <a:rPr lang="it-IT" sz="800" dirty="0">
+                <a:solidFill>
+                  <a:srgbClr val="000000"/>
+                </a:solidFill>
+                <a:latin typeface="Montserrat" panose="00000500000000000000" pitchFamily="2" charset="0"/>
+              </a:rPr>
+              <a:t>▪ Monitoraggio delle statistiche di vendita (KPI)</a:t>
+            </a:r>
+          </a:p>
+          <a:p>
+            <a:pPr marL="88900" indent="-88900"/>
+            <a:r>
+              <a:rPr lang="it-IT" sz="800" dirty="0">
+                <a:solidFill>
+                  <a:srgbClr val="000000"/>
+                </a:solidFill>
+                <a:latin typeface="Montserrat" panose="00000500000000000000" pitchFamily="2" charset="0"/>
+              </a:rPr>
+              <a:t>▪ Garantire il raggiungimento degli obiettivi commerciali</a:t>
+            </a:r>
+          </a:p>
+          <a:p>
+            <a:pPr marL="88900" indent="-88900"/>
+            <a:r>
+              <a:rPr lang="it-IT" sz="800" dirty="0">
+                <a:solidFill>
+                  <a:srgbClr val="000000"/>
+                </a:solidFill>
+                <a:latin typeface="Montserrat" panose="00000500000000000000" pitchFamily="2" charset="0"/>
+              </a:rPr>
+              <a:t>▪ Gestione pratiche di finanziamento, leasing e NLT</a:t>
+            </a:r>
+          </a:p>
+          <a:p>
+            <a:pPr marL="88900" indent="-88900"/>
+            <a:r>
+              <a:rPr lang="it-IT" sz="800" dirty="0">
+                <a:solidFill>
+                  <a:srgbClr val="000000"/>
+                </a:solidFill>
+                <a:latin typeface="Montserrat" panose="00000500000000000000" pitchFamily="2" charset="0"/>
+              </a:rPr>
+              <a:t>▪ Gestione criticità</a:t>
+            </a:r>
+          </a:p>
+        </p:txBody>
+      </p:sp>
+      <p:sp>
+        <p:nvSpPr>
+          <p:cNvPr id="305" name="CasellaDiTesto 304">
+            <a:extLst>
+              <a:ext uri="{FF2B5EF4-FFF2-40B4-BE49-F238E27FC236}">
+                <a16:creationId xmlns:a16="http://schemas.microsoft.com/office/drawing/2014/main" id="{2D186533-6CF2-43CD-A39C-AF8F1302032E}"/>
+              </a:ext>
+            </a:extLst>
+          </p:cNvPr>
+          <p:cNvSpPr txBox="1"/>
+          <p:nvPr/>
+        </p:nvSpPr>
+        <p:spPr>
+          <a:xfrm>
+            <a:off x="3070175" y="2543389"/>
+            <a:ext cx="535180" cy="200055"/>
+          </a:xfrm>
+          <a:prstGeom prst="rect">
+            <a:avLst/>
+          </a:prstGeom>
+          <a:noFill/>
+        </p:spPr>
+        <p:txBody>
+          <a:bodyPr wrap="square" rtlCol="0">
+            <a:spAutoFit/>
+          </a:bodyPr>
+          <a:lstStyle/>
+          <a:p>
+            <a:r>
+              <a:rPr lang="it-IT" sz="700" dirty="0">
+                <a:solidFill>
+                  <a:srgbClr val="A9ABAA"/>
+                </a:solidFill>
+                <a:latin typeface="Montserrat Light" panose="00000400000000000000" pitchFamily="2" charset="0"/>
+              </a:rPr>
+              <a:t>Amicar</a:t>
+            </a:r>
+          </a:p>
+        </p:txBody>
+      </p:sp>
+      <p:grpSp>
+        <p:nvGrpSpPr>
+          <p:cNvPr id="306" name="Google Shape;4859;p37">
+            <a:extLst>
+              <a:ext uri="{FF2B5EF4-FFF2-40B4-BE49-F238E27FC236}">
+                <a16:creationId xmlns:a16="http://schemas.microsoft.com/office/drawing/2014/main" id="{B4FC79D4-553C-442F-93B3-C689AE90004D}"/>
+              </a:ext>
+            </a:extLst>
+          </p:cNvPr>
+          <p:cNvGrpSpPr/>
+          <p:nvPr/>
+        </p:nvGrpSpPr>
+        <p:grpSpPr>
+          <a:xfrm>
+            <a:off x="2983312" y="2571492"/>
+            <a:ext cx="125683" cy="126926"/>
+            <a:chOff x="-59100700" y="1911950"/>
+            <a:chExt cx="315875" cy="319000"/>
+          </a:xfrm>
+        </p:grpSpPr>
+        <p:sp>
+          <p:nvSpPr>
+            <p:cNvPr id="307" name="Google Shape;4860;p37">
+              <a:extLst>
+                <a:ext uri="{FF2B5EF4-FFF2-40B4-BE49-F238E27FC236}">
+                  <a16:creationId xmlns:a16="http://schemas.microsoft.com/office/drawing/2014/main" id="{55C43056-1CAD-42EC-8224-74F0AECCAF70}"/>
+                </a:ext>
+              </a:extLst>
+            </p:cNvPr>
+            <p:cNvSpPr/>
+            <p:nvPr/>
+          </p:nvSpPr>
+          <p:spPr>
+            <a:xfrm>
+              <a:off x="-59015625" y="1993850"/>
+              <a:ext cx="20500" cy="20525"/>
+            </a:xfrm>
+            <a:custGeom>
+              <a:avLst/>
+              <a:gdLst/>
+              <a:ahLst/>
+              <a:cxnLst/>
+              <a:rect l="l" t="t" r="r" b="b"/>
+              <a:pathLst>
+                <a:path w="820" h="821" extrusionOk="0">
+                  <a:moveTo>
+                    <a:pt x="189" y="1"/>
+                  </a:moveTo>
+                  <a:cubicBezTo>
+                    <a:pt x="63" y="1"/>
+                    <a:pt x="0" y="64"/>
+                    <a:pt x="0" y="190"/>
+                  </a:cubicBezTo>
+                  <a:lnTo>
+                    <a:pt x="0" y="631"/>
+                  </a:lnTo>
+                  <a:cubicBezTo>
+                    <a:pt x="0" y="757"/>
+                    <a:pt x="95" y="820"/>
+                    <a:pt x="189" y="820"/>
+                  </a:cubicBezTo>
+                  <a:lnTo>
+                    <a:pt x="630" y="820"/>
+                  </a:lnTo>
+                  <a:cubicBezTo>
+                    <a:pt x="725" y="820"/>
+                    <a:pt x="820" y="757"/>
+                    <a:pt x="820" y="631"/>
+                  </a:cubicBezTo>
+                  <a:lnTo>
+                    <a:pt x="820" y="190"/>
+                  </a:lnTo>
+                  <a:cubicBezTo>
+                    <a:pt x="820" y="64"/>
+                    <a:pt x="725" y="1"/>
+                    <a:pt x="630" y="1"/>
+                  </a:cubicBezTo>
+                  <a:close/>
+                </a:path>
+              </a:pathLst>
+            </a:custGeom>
+            <a:solidFill>
+              <a:srgbClr val="A9ABAA"/>
+            </a:solidFill>
+            <a:ln>
+              <a:noFill/>
+            </a:ln>
+          </p:spPr>
+          <p:txBody>
+            <a:bodyPr spcFirstLastPara="1" wrap="square" lIns="91425" tIns="91425" rIns="91425" bIns="91425" anchor="ctr" anchorCtr="0">
+              <a:noAutofit/>
+            </a:bodyPr>
+            <a:lstStyle/>
+            <a:p>
+              <a:pPr marL="0" lvl="0" indent="0" algn="l" rtl="0">
+                <a:spcBef>
+                  <a:spcPts val="0"/>
+                </a:spcBef>
+                <a:spcAft>
+                  <a:spcPts val="0"/>
+                </a:spcAft>
+                <a:buNone/>
+              </a:pPr>
+              <a:endParaRPr/>
+            </a:p>
+          </p:txBody>
+        </p:sp>
+        <p:sp>
+          <p:nvSpPr>
+            <p:cNvPr id="308" name="Google Shape;4861;p37">
+              <a:extLst>
+                <a:ext uri="{FF2B5EF4-FFF2-40B4-BE49-F238E27FC236}">
+                  <a16:creationId xmlns:a16="http://schemas.microsoft.com/office/drawing/2014/main" id="{39F96A0F-3FFB-43FA-989B-A380D999A5BA}"/>
+                </a:ext>
+              </a:extLst>
+            </p:cNvPr>
+            <p:cNvSpPr/>
+            <p:nvPr/>
+          </p:nvSpPr>
+          <p:spPr>
+            <a:xfrm>
+              <a:off x="-58954200" y="1993850"/>
+              <a:ext cx="21300" cy="20525"/>
+            </a:xfrm>
+            <a:custGeom>
+              <a:avLst/>
+              <a:gdLst/>
+              <a:ahLst/>
+              <a:cxnLst/>
+              <a:rect l="l" t="t" r="r" b="b"/>
+              <a:pathLst>
+                <a:path w="852" h="821" extrusionOk="0">
+                  <a:moveTo>
+                    <a:pt x="221" y="1"/>
+                  </a:moveTo>
+                  <a:cubicBezTo>
+                    <a:pt x="95" y="1"/>
+                    <a:pt x="1" y="64"/>
+                    <a:pt x="1" y="190"/>
+                  </a:cubicBezTo>
+                  <a:lnTo>
+                    <a:pt x="1" y="631"/>
+                  </a:lnTo>
+                  <a:cubicBezTo>
+                    <a:pt x="1" y="757"/>
+                    <a:pt x="127" y="820"/>
+                    <a:pt x="221" y="820"/>
+                  </a:cubicBezTo>
+                  <a:lnTo>
+                    <a:pt x="631" y="820"/>
+                  </a:lnTo>
+                  <a:cubicBezTo>
+                    <a:pt x="757" y="820"/>
+                    <a:pt x="851" y="757"/>
+                    <a:pt x="851" y="631"/>
+                  </a:cubicBezTo>
+                  <a:lnTo>
+                    <a:pt x="851" y="190"/>
+                  </a:lnTo>
+                  <a:cubicBezTo>
+                    <a:pt x="851" y="64"/>
+                    <a:pt x="757" y="1"/>
+                    <a:pt x="631" y="1"/>
+                  </a:cubicBezTo>
+                  <a:close/>
+                </a:path>
+              </a:pathLst>
+            </a:custGeom>
+            <a:solidFill>
+              <a:srgbClr val="A9ABAA"/>
+            </a:solidFill>
+            <a:ln>
+              <a:noFill/>
+            </a:ln>
+          </p:spPr>
+          <p:txBody>
+            <a:bodyPr spcFirstLastPara="1" wrap="square" lIns="91425" tIns="91425" rIns="91425" bIns="91425" anchor="ctr" anchorCtr="0">
+              <a:noAutofit/>
+            </a:bodyPr>
+            <a:lstStyle/>
+            <a:p>
+              <a:pPr marL="0" lvl="0" indent="0" algn="l" rtl="0">
+                <a:spcBef>
+                  <a:spcPts val="0"/>
+                </a:spcBef>
+                <a:spcAft>
+                  <a:spcPts val="0"/>
+                </a:spcAft>
+                <a:buNone/>
+              </a:pPr>
+              <a:endParaRPr/>
+            </a:p>
+          </p:txBody>
+        </p:sp>
+        <p:sp>
+          <p:nvSpPr>
+            <p:cNvPr id="309" name="Google Shape;4862;p37">
+              <a:extLst>
+                <a:ext uri="{FF2B5EF4-FFF2-40B4-BE49-F238E27FC236}">
+                  <a16:creationId xmlns:a16="http://schemas.microsoft.com/office/drawing/2014/main" id="{A0C2F037-107C-47C6-8CA2-8057078A567F}"/>
+                </a:ext>
+              </a:extLst>
+            </p:cNvPr>
+            <p:cNvSpPr/>
+            <p:nvPr/>
+          </p:nvSpPr>
+          <p:spPr>
+            <a:xfrm>
+              <a:off x="-58891975" y="1993850"/>
+              <a:ext cx="21300" cy="20525"/>
+            </a:xfrm>
+            <a:custGeom>
+              <a:avLst/>
+              <a:gdLst/>
+              <a:ahLst/>
+              <a:cxnLst/>
+              <a:rect l="l" t="t" r="r" b="b"/>
+              <a:pathLst>
+                <a:path w="852" h="821" extrusionOk="0">
+                  <a:moveTo>
+                    <a:pt x="190" y="1"/>
+                  </a:moveTo>
+                  <a:cubicBezTo>
+                    <a:pt x="95" y="1"/>
+                    <a:pt x="1" y="64"/>
+                    <a:pt x="1" y="190"/>
+                  </a:cubicBezTo>
+                  <a:lnTo>
+                    <a:pt x="1" y="631"/>
+                  </a:lnTo>
+                  <a:cubicBezTo>
+                    <a:pt x="1" y="757"/>
+                    <a:pt x="127" y="820"/>
+                    <a:pt x="190" y="820"/>
+                  </a:cubicBezTo>
+                  <a:lnTo>
+                    <a:pt x="631" y="820"/>
+                  </a:lnTo>
+                  <a:cubicBezTo>
+                    <a:pt x="757" y="820"/>
+                    <a:pt x="851" y="757"/>
+                    <a:pt x="851" y="631"/>
+                  </a:cubicBezTo>
+                  <a:lnTo>
+                    <a:pt x="851" y="190"/>
+                  </a:lnTo>
+                  <a:cubicBezTo>
+                    <a:pt x="851" y="64"/>
+                    <a:pt x="757" y="1"/>
+                    <a:pt x="631" y="1"/>
+                  </a:cubicBezTo>
+                  <a:close/>
+                </a:path>
+              </a:pathLst>
+            </a:custGeom>
+            <a:solidFill>
+              <a:srgbClr val="A9ABAA"/>
+            </a:solidFill>
+            <a:ln>
+              <a:noFill/>
+            </a:ln>
+          </p:spPr>
+          <p:txBody>
+            <a:bodyPr spcFirstLastPara="1" wrap="square" lIns="91425" tIns="91425" rIns="91425" bIns="91425" anchor="ctr" anchorCtr="0">
+              <a:noAutofit/>
+            </a:bodyPr>
+            <a:lstStyle/>
+            <a:p>
+              <a:pPr marL="0" lvl="0" indent="0" algn="l" rtl="0">
+                <a:spcBef>
+                  <a:spcPts val="0"/>
+                </a:spcBef>
+                <a:spcAft>
+                  <a:spcPts val="0"/>
+                </a:spcAft>
+                <a:buNone/>
+              </a:pPr>
+              <a:endParaRPr/>
+            </a:p>
+          </p:txBody>
+        </p:sp>
+        <p:sp>
+          <p:nvSpPr>
+            <p:cNvPr id="310" name="Google Shape;4863;p37">
+              <a:extLst>
+                <a:ext uri="{FF2B5EF4-FFF2-40B4-BE49-F238E27FC236}">
+                  <a16:creationId xmlns:a16="http://schemas.microsoft.com/office/drawing/2014/main" id="{71BC84DF-90B4-4181-8A19-CF2152E71FA6}"/>
+                </a:ext>
+              </a:extLst>
+            </p:cNvPr>
+            <p:cNvSpPr/>
+            <p:nvPr/>
+          </p:nvSpPr>
+          <p:spPr>
+            <a:xfrm>
+              <a:off x="-59015625" y="2034825"/>
+              <a:ext cx="20500" cy="21275"/>
+            </a:xfrm>
+            <a:custGeom>
+              <a:avLst/>
+              <a:gdLst/>
+              <a:ahLst/>
+              <a:cxnLst/>
+              <a:rect l="l" t="t" r="r" b="b"/>
+              <a:pathLst>
+                <a:path w="820" h="851" extrusionOk="0">
+                  <a:moveTo>
+                    <a:pt x="189" y="0"/>
+                  </a:moveTo>
+                  <a:cubicBezTo>
+                    <a:pt x="63" y="0"/>
+                    <a:pt x="0" y="95"/>
+                    <a:pt x="0" y="221"/>
+                  </a:cubicBezTo>
+                  <a:lnTo>
+                    <a:pt x="0" y="630"/>
+                  </a:lnTo>
+                  <a:cubicBezTo>
+                    <a:pt x="0" y="756"/>
+                    <a:pt x="95" y="851"/>
+                    <a:pt x="189" y="851"/>
+                  </a:cubicBezTo>
+                  <a:lnTo>
+                    <a:pt x="630" y="851"/>
+                  </a:lnTo>
+                  <a:cubicBezTo>
+                    <a:pt x="725" y="851"/>
+                    <a:pt x="820" y="756"/>
+                    <a:pt x="820" y="630"/>
+                  </a:cubicBezTo>
+                  <a:lnTo>
+                    <a:pt x="820" y="221"/>
+                  </a:lnTo>
+                  <a:cubicBezTo>
+                    <a:pt x="820" y="95"/>
+                    <a:pt x="725" y="0"/>
+                    <a:pt x="630" y="0"/>
+                  </a:cubicBezTo>
+                  <a:close/>
+                </a:path>
+              </a:pathLst>
+            </a:custGeom>
+            <a:solidFill>
+              <a:srgbClr val="A9ABAA"/>
+            </a:solidFill>
+            <a:ln>
+              <a:noFill/>
+            </a:ln>
+          </p:spPr>
+          <p:txBody>
+            <a:bodyPr spcFirstLastPara="1" wrap="square" lIns="91425" tIns="91425" rIns="91425" bIns="91425" anchor="ctr" anchorCtr="0">
+              <a:noAutofit/>
+            </a:bodyPr>
+            <a:lstStyle/>
+            <a:p>
+              <a:pPr marL="0" lvl="0" indent="0" algn="l" rtl="0">
+                <a:spcBef>
+                  <a:spcPts val="0"/>
+                </a:spcBef>
+                <a:spcAft>
+                  <a:spcPts val="0"/>
+                </a:spcAft>
+                <a:buNone/>
+              </a:pPr>
+              <a:endParaRPr/>
+            </a:p>
+          </p:txBody>
+        </p:sp>
+        <p:sp>
+          <p:nvSpPr>
+            <p:cNvPr id="311" name="Google Shape;4864;p37">
+              <a:extLst>
+                <a:ext uri="{FF2B5EF4-FFF2-40B4-BE49-F238E27FC236}">
+                  <a16:creationId xmlns:a16="http://schemas.microsoft.com/office/drawing/2014/main" id="{8E485103-16FF-464E-82C8-D0AE178B4DEE}"/>
+                </a:ext>
+              </a:extLst>
+            </p:cNvPr>
+            <p:cNvSpPr/>
+            <p:nvPr/>
+          </p:nvSpPr>
+          <p:spPr>
+            <a:xfrm>
+              <a:off x="-58954200" y="2034825"/>
+              <a:ext cx="21300" cy="21275"/>
+            </a:xfrm>
+            <a:custGeom>
+              <a:avLst/>
+              <a:gdLst/>
+              <a:ahLst/>
+              <a:cxnLst/>
+              <a:rect l="l" t="t" r="r" b="b"/>
+              <a:pathLst>
+                <a:path w="852" h="851" extrusionOk="0">
+                  <a:moveTo>
+                    <a:pt x="221" y="0"/>
+                  </a:moveTo>
+                  <a:cubicBezTo>
+                    <a:pt x="95" y="0"/>
+                    <a:pt x="1" y="95"/>
+                    <a:pt x="1" y="221"/>
+                  </a:cubicBezTo>
+                  <a:lnTo>
+                    <a:pt x="1" y="630"/>
+                  </a:lnTo>
+                  <a:cubicBezTo>
+                    <a:pt x="1" y="756"/>
+                    <a:pt x="127" y="851"/>
+                    <a:pt x="221" y="851"/>
+                  </a:cubicBezTo>
+                  <a:lnTo>
+                    <a:pt x="631" y="851"/>
+                  </a:lnTo>
+                  <a:cubicBezTo>
+                    <a:pt x="757" y="851"/>
+                    <a:pt x="851" y="756"/>
+                    <a:pt x="851" y="630"/>
+                  </a:cubicBezTo>
+                  <a:lnTo>
+                    <a:pt x="851" y="221"/>
+                  </a:lnTo>
+                  <a:cubicBezTo>
+                    <a:pt x="851" y="95"/>
+                    <a:pt x="757" y="0"/>
+                    <a:pt x="631" y="0"/>
+                  </a:cubicBezTo>
+                  <a:close/>
+                </a:path>
+              </a:pathLst>
+            </a:custGeom>
+            <a:solidFill>
+              <a:srgbClr val="A9ABAA"/>
+            </a:solidFill>
+            <a:ln>
+              <a:noFill/>
+            </a:ln>
+          </p:spPr>
+          <p:txBody>
+            <a:bodyPr spcFirstLastPara="1" wrap="square" lIns="91425" tIns="91425" rIns="91425" bIns="91425" anchor="ctr" anchorCtr="0">
+              <a:noAutofit/>
+            </a:bodyPr>
+            <a:lstStyle/>
+            <a:p>
+              <a:pPr marL="0" lvl="0" indent="0" algn="l" rtl="0">
+                <a:spcBef>
+                  <a:spcPts val="0"/>
+                </a:spcBef>
+                <a:spcAft>
+                  <a:spcPts val="0"/>
+                </a:spcAft>
+                <a:buNone/>
+              </a:pPr>
+              <a:endParaRPr/>
+            </a:p>
+          </p:txBody>
+        </p:sp>
+        <p:sp>
+          <p:nvSpPr>
+            <p:cNvPr id="312" name="Google Shape;4865;p37">
+              <a:extLst>
+                <a:ext uri="{FF2B5EF4-FFF2-40B4-BE49-F238E27FC236}">
+                  <a16:creationId xmlns:a16="http://schemas.microsoft.com/office/drawing/2014/main" id="{B2C38C1E-9279-43A4-81BF-A452A7924261}"/>
+                </a:ext>
+              </a:extLst>
+            </p:cNvPr>
+            <p:cNvSpPr/>
+            <p:nvPr/>
+          </p:nvSpPr>
+          <p:spPr>
+            <a:xfrm>
+              <a:off x="-58891975" y="2034825"/>
+              <a:ext cx="21300" cy="21275"/>
+            </a:xfrm>
+            <a:custGeom>
+              <a:avLst/>
+              <a:gdLst/>
+              <a:ahLst/>
+              <a:cxnLst/>
+              <a:rect l="l" t="t" r="r" b="b"/>
+              <a:pathLst>
+                <a:path w="852" h="851" extrusionOk="0">
+                  <a:moveTo>
+                    <a:pt x="190" y="0"/>
+                  </a:moveTo>
+                  <a:cubicBezTo>
+                    <a:pt x="95" y="0"/>
+                    <a:pt x="1" y="95"/>
+                    <a:pt x="1" y="221"/>
+                  </a:cubicBezTo>
+                  <a:lnTo>
+                    <a:pt x="1" y="630"/>
+                  </a:lnTo>
+                  <a:cubicBezTo>
+                    <a:pt x="1" y="756"/>
+                    <a:pt x="127" y="851"/>
+                    <a:pt x="190" y="851"/>
+                  </a:cubicBezTo>
+                  <a:lnTo>
+                    <a:pt x="631" y="851"/>
+                  </a:lnTo>
+                  <a:cubicBezTo>
+                    <a:pt x="757" y="851"/>
+                    <a:pt x="851" y="756"/>
+                    <a:pt x="851" y="630"/>
+                  </a:cubicBezTo>
+                  <a:lnTo>
+                    <a:pt x="851" y="221"/>
+                  </a:lnTo>
+                  <a:cubicBezTo>
+                    <a:pt x="851" y="95"/>
+                    <a:pt x="757" y="0"/>
+                    <a:pt x="631" y="0"/>
+                  </a:cubicBezTo>
+                  <a:close/>
+                </a:path>
+              </a:pathLst>
+            </a:custGeom>
+            <a:solidFill>
+              <a:srgbClr val="A9ABAA"/>
+            </a:solidFill>
+            <a:ln>
+              <a:noFill/>
+            </a:ln>
+          </p:spPr>
+          <p:txBody>
+            <a:bodyPr spcFirstLastPara="1" wrap="square" lIns="91425" tIns="91425" rIns="91425" bIns="91425" anchor="ctr" anchorCtr="0">
+              <a:noAutofit/>
+            </a:bodyPr>
+            <a:lstStyle/>
+            <a:p>
+              <a:pPr marL="0" lvl="0" indent="0" algn="l" rtl="0">
+                <a:spcBef>
+                  <a:spcPts val="0"/>
+                </a:spcBef>
+                <a:spcAft>
+                  <a:spcPts val="0"/>
+                </a:spcAft>
+                <a:buNone/>
+              </a:pPr>
+              <a:endParaRPr/>
+            </a:p>
+          </p:txBody>
+        </p:sp>
+        <p:sp>
+          <p:nvSpPr>
+            <p:cNvPr id="313" name="Google Shape;4866;p37">
+              <a:extLst>
+                <a:ext uri="{FF2B5EF4-FFF2-40B4-BE49-F238E27FC236}">
+                  <a16:creationId xmlns:a16="http://schemas.microsoft.com/office/drawing/2014/main" id="{55748D51-B2C8-424F-8D70-80B8031F7F8D}"/>
+                </a:ext>
+              </a:extLst>
+            </p:cNvPr>
+            <p:cNvSpPr/>
+            <p:nvPr/>
+          </p:nvSpPr>
+          <p:spPr>
+            <a:xfrm>
+              <a:off x="-59015625" y="2076550"/>
+              <a:ext cx="20500" cy="20525"/>
+            </a:xfrm>
+            <a:custGeom>
+              <a:avLst/>
+              <a:gdLst/>
+              <a:ahLst/>
+              <a:cxnLst/>
+              <a:rect l="l" t="t" r="r" b="b"/>
+              <a:pathLst>
+                <a:path w="820" h="821" extrusionOk="0">
+                  <a:moveTo>
+                    <a:pt x="189" y="1"/>
+                  </a:moveTo>
+                  <a:cubicBezTo>
+                    <a:pt x="63" y="1"/>
+                    <a:pt x="0" y="64"/>
+                    <a:pt x="0" y="190"/>
+                  </a:cubicBezTo>
+                  <a:lnTo>
+                    <a:pt x="0" y="631"/>
+                  </a:lnTo>
+                  <a:cubicBezTo>
+                    <a:pt x="0" y="757"/>
+                    <a:pt x="95" y="820"/>
+                    <a:pt x="189" y="820"/>
+                  </a:cubicBezTo>
+                  <a:lnTo>
+                    <a:pt x="630" y="820"/>
+                  </a:lnTo>
+                  <a:cubicBezTo>
+                    <a:pt x="725" y="820"/>
+                    <a:pt x="820" y="757"/>
+                    <a:pt x="820" y="631"/>
+                  </a:cubicBezTo>
+                  <a:lnTo>
+                    <a:pt x="820" y="190"/>
+                  </a:lnTo>
+                  <a:cubicBezTo>
+                    <a:pt x="820" y="64"/>
+                    <a:pt x="725" y="1"/>
+                    <a:pt x="630" y="1"/>
+                  </a:cubicBezTo>
+                  <a:close/>
+                </a:path>
+              </a:pathLst>
+            </a:custGeom>
+            <a:solidFill>
+              <a:srgbClr val="A9ABAA"/>
+            </a:solidFill>
+            <a:ln>
+              <a:noFill/>
+            </a:ln>
+          </p:spPr>
+          <p:txBody>
+            <a:bodyPr spcFirstLastPara="1" wrap="square" lIns="91425" tIns="91425" rIns="91425" bIns="91425" anchor="ctr" anchorCtr="0">
+              <a:noAutofit/>
+            </a:bodyPr>
+            <a:lstStyle/>
+            <a:p>
+              <a:pPr marL="0" lvl="0" indent="0" algn="l" rtl="0">
+                <a:spcBef>
+                  <a:spcPts val="0"/>
+                </a:spcBef>
+                <a:spcAft>
+                  <a:spcPts val="0"/>
+                </a:spcAft>
+                <a:buNone/>
+              </a:pPr>
+              <a:endParaRPr/>
+            </a:p>
+          </p:txBody>
+        </p:sp>
+        <p:sp>
+          <p:nvSpPr>
+            <p:cNvPr id="314" name="Google Shape;4867;p37">
+              <a:extLst>
+                <a:ext uri="{FF2B5EF4-FFF2-40B4-BE49-F238E27FC236}">
+                  <a16:creationId xmlns:a16="http://schemas.microsoft.com/office/drawing/2014/main" id="{C87CF638-E5BB-4464-B99E-A5FE46A1087A}"/>
+                </a:ext>
+              </a:extLst>
+            </p:cNvPr>
+            <p:cNvSpPr/>
+            <p:nvPr/>
+          </p:nvSpPr>
+          <p:spPr>
+            <a:xfrm>
+              <a:off x="-58954200" y="2076550"/>
+              <a:ext cx="21300" cy="20525"/>
+            </a:xfrm>
+            <a:custGeom>
+              <a:avLst/>
+              <a:gdLst/>
+              <a:ahLst/>
+              <a:cxnLst/>
+              <a:rect l="l" t="t" r="r" b="b"/>
+              <a:pathLst>
+                <a:path w="852" h="821" extrusionOk="0">
+                  <a:moveTo>
+                    <a:pt x="221" y="1"/>
+                  </a:moveTo>
+                  <a:cubicBezTo>
+                    <a:pt x="95" y="1"/>
+                    <a:pt x="1" y="64"/>
+                    <a:pt x="1" y="190"/>
+                  </a:cubicBezTo>
+                  <a:lnTo>
+                    <a:pt x="1" y="631"/>
+                  </a:lnTo>
+                  <a:cubicBezTo>
+                    <a:pt x="1" y="757"/>
+                    <a:pt x="127" y="820"/>
+                    <a:pt x="221" y="820"/>
+                  </a:cubicBezTo>
+                  <a:lnTo>
+                    <a:pt x="631" y="820"/>
+                  </a:lnTo>
+                  <a:cubicBezTo>
+                    <a:pt x="757" y="820"/>
+                    <a:pt x="851" y="757"/>
+                    <a:pt x="851" y="631"/>
+                  </a:cubicBezTo>
+                  <a:lnTo>
+                    <a:pt x="851" y="190"/>
+                  </a:lnTo>
+                  <a:cubicBezTo>
+                    <a:pt x="851" y="64"/>
+                    <a:pt x="757" y="1"/>
+                    <a:pt x="631" y="1"/>
+                  </a:cubicBezTo>
+                  <a:close/>
+                </a:path>
+              </a:pathLst>
+            </a:custGeom>
+            <a:solidFill>
+              <a:srgbClr val="A9ABAA"/>
+            </a:solidFill>
+            <a:ln>
+              <a:noFill/>
+            </a:ln>
+          </p:spPr>
+          <p:txBody>
+            <a:bodyPr spcFirstLastPara="1" wrap="square" lIns="91425" tIns="91425" rIns="91425" bIns="91425" anchor="ctr" anchorCtr="0">
+              <a:noAutofit/>
+            </a:bodyPr>
+            <a:lstStyle/>
+            <a:p>
+              <a:pPr marL="0" lvl="0" indent="0" algn="l" rtl="0">
+                <a:spcBef>
+                  <a:spcPts val="0"/>
+                </a:spcBef>
+                <a:spcAft>
+                  <a:spcPts val="0"/>
+                </a:spcAft>
+                <a:buNone/>
+              </a:pPr>
+              <a:endParaRPr/>
+            </a:p>
+          </p:txBody>
+        </p:sp>
+        <p:sp>
+          <p:nvSpPr>
+            <p:cNvPr id="315" name="Google Shape;4868;p37">
+              <a:extLst>
+                <a:ext uri="{FF2B5EF4-FFF2-40B4-BE49-F238E27FC236}">
+                  <a16:creationId xmlns:a16="http://schemas.microsoft.com/office/drawing/2014/main" id="{4C0E0938-A26B-4D7D-8120-0DED74E57808}"/>
+                </a:ext>
+              </a:extLst>
+            </p:cNvPr>
+            <p:cNvSpPr/>
+            <p:nvPr/>
+          </p:nvSpPr>
+          <p:spPr>
+            <a:xfrm>
+              <a:off x="-58891975" y="2076550"/>
+              <a:ext cx="21300" cy="20525"/>
+            </a:xfrm>
+            <a:custGeom>
+              <a:avLst/>
+              <a:gdLst/>
+              <a:ahLst/>
+              <a:cxnLst/>
+              <a:rect l="l" t="t" r="r" b="b"/>
+              <a:pathLst>
+                <a:path w="852" h="821" extrusionOk="0">
+                  <a:moveTo>
+                    <a:pt x="190" y="1"/>
+                  </a:moveTo>
+                  <a:cubicBezTo>
+                    <a:pt x="95" y="1"/>
+                    <a:pt x="1" y="64"/>
+                    <a:pt x="1" y="190"/>
+                  </a:cubicBezTo>
+                  <a:lnTo>
+                    <a:pt x="1" y="631"/>
+                  </a:lnTo>
+                  <a:cubicBezTo>
+                    <a:pt x="1" y="757"/>
+                    <a:pt x="127" y="820"/>
+                    <a:pt x="190" y="820"/>
+                  </a:cubicBezTo>
+                  <a:lnTo>
+                    <a:pt x="631" y="820"/>
+                  </a:lnTo>
+                  <a:cubicBezTo>
+                    <a:pt x="757" y="820"/>
+                    <a:pt x="851" y="757"/>
+                    <a:pt x="851" y="631"/>
+                  </a:cubicBezTo>
+                  <a:lnTo>
+                    <a:pt x="851" y="190"/>
+                  </a:lnTo>
+                  <a:cubicBezTo>
+                    <a:pt x="851" y="64"/>
+                    <a:pt x="757" y="1"/>
+                    <a:pt x="631" y="1"/>
+                  </a:cubicBezTo>
+                  <a:close/>
+                </a:path>
+              </a:pathLst>
+            </a:custGeom>
+            <a:solidFill>
+              <a:srgbClr val="A9ABAA"/>
+            </a:solidFill>
+            <a:ln>
+              <a:noFill/>
+            </a:ln>
+          </p:spPr>
+          <p:txBody>
+            <a:bodyPr spcFirstLastPara="1" wrap="square" lIns="91425" tIns="91425" rIns="91425" bIns="91425" anchor="ctr" anchorCtr="0">
+              <a:noAutofit/>
+            </a:bodyPr>
+            <a:lstStyle/>
+            <a:p>
+              <a:pPr marL="0" lvl="0" indent="0" algn="l" rtl="0">
+                <a:spcBef>
+                  <a:spcPts val="0"/>
+                </a:spcBef>
+                <a:spcAft>
+                  <a:spcPts val="0"/>
+                </a:spcAft>
+                <a:buNone/>
+              </a:pPr>
+              <a:endParaRPr/>
+            </a:p>
+          </p:txBody>
+        </p:sp>
+        <p:sp>
+          <p:nvSpPr>
+            <p:cNvPr id="316" name="Google Shape;4869;p37">
+              <a:extLst>
+                <a:ext uri="{FF2B5EF4-FFF2-40B4-BE49-F238E27FC236}">
+                  <a16:creationId xmlns:a16="http://schemas.microsoft.com/office/drawing/2014/main" id="{9FCE7C18-A294-483E-B882-9A4BC083CA4F}"/>
+                </a:ext>
+              </a:extLst>
+            </p:cNvPr>
+            <p:cNvSpPr/>
+            <p:nvPr/>
+          </p:nvSpPr>
+          <p:spPr>
+            <a:xfrm>
+              <a:off x="-59100700" y="1911950"/>
+              <a:ext cx="315875" cy="319000"/>
+            </a:xfrm>
+            <a:custGeom>
+              <a:avLst/>
+              <a:gdLst/>
+              <a:ahLst/>
+              <a:cxnLst/>
+              <a:rect l="l" t="t" r="r" b="b"/>
+              <a:pathLst>
+                <a:path w="12635" h="12760" extrusionOk="0">
+                  <a:moveTo>
+                    <a:pt x="9169" y="788"/>
+                  </a:moveTo>
+                  <a:lnTo>
+                    <a:pt x="9169" y="1607"/>
+                  </a:lnTo>
+                  <a:lnTo>
+                    <a:pt x="3403" y="1607"/>
+                  </a:lnTo>
+                  <a:lnTo>
+                    <a:pt x="3403" y="788"/>
+                  </a:lnTo>
+                  <a:close/>
+                  <a:moveTo>
+                    <a:pt x="1734" y="9074"/>
+                  </a:moveTo>
+                  <a:lnTo>
+                    <a:pt x="1734" y="11815"/>
+                  </a:lnTo>
+                  <a:lnTo>
+                    <a:pt x="788" y="11815"/>
+                  </a:lnTo>
+                  <a:lnTo>
+                    <a:pt x="788" y="9074"/>
+                  </a:lnTo>
+                  <a:close/>
+                  <a:moveTo>
+                    <a:pt x="5861" y="9074"/>
+                  </a:moveTo>
+                  <a:lnTo>
+                    <a:pt x="5861" y="11815"/>
+                  </a:lnTo>
+                  <a:lnTo>
+                    <a:pt x="4223" y="11815"/>
+                  </a:lnTo>
+                  <a:lnTo>
+                    <a:pt x="4223" y="9074"/>
+                  </a:lnTo>
+                  <a:close/>
+                  <a:moveTo>
+                    <a:pt x="8350" y="9074"/>
+                  </a:moveTo>
+                  <a:lnTo>
+                    <a:pt x="8350" y="11815"/>
+                  </a:lnTo>
+                  <a:lnTo>
+                    <a:pt x="6711" y="11815"/>
+                  </a:lnTo>
+                  <a:lnTo>
+                    <a:pt x="6711" y="9074"/>
+                  </a:lnTo>
+                  <a:close/>
+                  <a:moveTo>
+                    <a:pt x="10051" y="2458"/>
+                  </a:moveTo>
+                  <a:lnTo>
+                    <a:pt x="10051" y="11815"/>
+                  </a:lnTo>
+                  <a:lnTo>
+                    <a:pt x="9169" y="11815"/>
+                  </a:lnTo>
+                  <a:lnTo>
+                    <a:pt x="9169" y="8664"/>
+                  </a:lnTo>
+                  <a:cubicBezTo>
+                    <a:pt x="9169" y="8444"/>
+                    <a:pt x="8980" y="8223"/>
+                    <a:pt x="8791" y="8223"/>
+                  </a:cubicBezTo>
+                  <a:lnTo>
+                    <a:pt x="3813" y="8223"/>
+                  </a:lnTo>
+                  <a:cubicBezTo>
+                    <a:pt x="3592" y="8223"/>
+                    <a:pt x="3435" y="8444"/>
+                    <a:pt x="3435" y="8664"/>
+                  </a:cubicBezTo>
+                  <a:lnTo>
+                    <a:pt x="3435" y="11815"/>
+                  </a:lnTo>
+                  <a:lnTo>
+                    <a:pt x="2616" y="11815"/>
+                  </a:lnTo>
+                  <a:lnTo>
+                    <a:pt x="2616" y="2458"/>
+                  </a:lnTo>
+                  <a:close/>
+                  <a:moveTo>
+                    <a:pt x="11815" y="9074"/>
+                  </a:moveTo>
+                  <a:lnTo>
+                    <a:pt x="11815" y="11815"/>
+                  </a:lnTo>
+                  <a:lnTo>
+                    <a:pt x="10839" y="11815"/>
+                  </a:lnTo>
+                  <a:lnTo>
+                    <a:pt x="10839" y="9074"/>
+                  </a:lnTo>
+                  <a:close/>
+                  <a:moveTo>
+                    <a:pt x="2994" y="0"/>
+                  </a:moveTo>
+                  <a:cubicBezTo>
+                    <a:pt x="2773" y="0"/>
+                    <a:pt x="2616" y="190"/>
+                    <a:pt x="2616" y="410"/>
+                  </a:cubicBezTo>
+                  <a:lnTo>
+                    <a:pt x="2616" y="1670"/>
+                  </a:lnTo>
+                  <a:lnTo>
+                    <a:pt x="2206" y="1670"/>
+                  </a:lnTo>
+                  <a:cubicBezTo>
+                    <a:pt x="1986" y="1670"/>
+                    <a:pt x="1765" y="1859"/>
+                    <a:pt x="1765" y="2080"/>
+                  </a:cubicBezTo>
+                  <a:lnTo>
+                    <a:pt x="1765" y="8318"/>
+                  </a:lnTo>
+                  <a:lnTo>
+                    <a:pt x="410" y="8318"/>
+                  </a:lnTo>
+                  <a:cubicBezTo>
+                    <a:pt x="158" y="8318"/>
+                    <a:pt x="1" y="8507"/>
+                    <a:pt x="1" y="8727"/>
+                  </a:cubicBezTo>
+                  <a:lnTo>
+                    <a:pt x="1" y="12319"/>
+                  </a:lnTo>
+                  <a:cubicBezTo>
+                    <a:pt x="1" y="12571"/>
+                    <a:pt x="190" y="12760"/>
+                    <a:pt x="410" y="12760"/>
+                  </a:cubicBezTo>
+                  <a:lnTo>
+                    <a:pt x="12256" y="12760"/>
+                  </a:lnTo>
+                  <a:cubicBezTo>
+                    <a:pt x="12477" y="12760"/>
+                    <a:pt x="12634" y="12571"/>
+                    <a:pt x="12634" y="12319"/>
+                  </a:cubicBezTo>
+                  <a:lnTo>
+                    <a:pt x="12634" y="8664"/>
+                  </a:lnTo>
+                  <a:cubicBezTo>
+                    <a:pt x="12634" y="8444"/>
+                    <a:pt x="12445" y="8223"/>
+                    <a:pt x="12225" y="8223"/>
+                  </a:cubicBezTo>
+                  <a:lnTo>
+                    <a:pt x="10839" y="8223"/>
+                  </a:lnTo>
+                  <a:lnTo>
+                    <a:pt x="10839" y="2017"/>
+                  </a:lnTo>
+                  <a:cubicBezTo>
+                    <a:pt x="10839" y="1765"/>
+                    <a:pt x="10650" y="1576"/>
+                    <a:pt x="10429" y="1576"/>
+                  </a:cubicBezTo>
+                  <a:lnTo>
+                    <a:pt x="10019" y="1576"/>
+                  </a:lnTo>
+                  <a:lnTo>
+                    <a:pt x="10019" y="410"/>
+                  </a:lnTo>
+                  <a:cubicBezTo>
+                    <a:pt x="10019" y="158"/>
+                    <a:pt x="9799" y="0"/>
+                    <a:pt x="9610" y="0"/>
+                  </a:cubicBezTo>
+                  <a:close/>
+                </a:path>
+              </a:pathLst>
+            </a:custGeom>
+            <a:solidFill>
+              <a:srgbClr val="A9ABAA"/>
+            </a:solidFill>
+            <a:ln>
+              <a:noFill/>
+            </a:ln>
+          </p:spPr>
+          <p:txBody>
+            <a:bodyPr spcFirstLastPara="1" wrap="square" lIns="91425" tIns="91425" rIns="91425" bIns="91425" anchor="ctr" anchorCtr="0">
+              <a:noAutofit/>
+            </a:bodyPr>
+            <a:lstStyle/>
+            <a:p>
+              <a:pPr marL="0" lvl="0" indent="0" algn="l" rtl="0">
+                <a:spcBef>
+                  <a:spcPts val="0"/>
+                </a:spcBef>
+                <a:spcAft>
+                  <a:spcPts val="0"/>
+                </a:spcAft>
+                <a:buNone/>
+              </a:pPr>
+              <a:endParaRPr/>
+            </a:p>
+          </p:txBody>
+        </p:sp>
+      </p:grpSp>
     </p:spTree>
     <p:extLst>
       <p:ext uri="{BB962C8B-B14F-4D97-AF65-F5344CB8AC3E}">

</xml_diff>